<commit_message>
Data: Update PPT (Add RGB Image Desc)
</commit_message>
<xml_diff>
--- a/2024-1 dAiv 이미지분류 특강.pptx
+++ b/2024-1 dAiv 이미지분류 특강.pptx
@@ -5,7 +5,7 @@
     <p:sldMasterId id="2147483648" r:id="rId1"/>
   </p:sldMasterIdLst>
   <p:notesMasterIdLst>
-    <p:notesMasterId r:id="rId19"/>
+    <p:notesMasterId r:id="rId20"/>
   </p:notesMasterIdLst>
   <p:sldIdLst>
     <p:sldId id="256" r:id="rId2"/>
@@ -16,32 +16,33 @@
     <p:sldId id="276" r:id="rId7"/>
     <p:sldId id="277" r:id="rId8"/>
     <p:sldId id="261" r:id="rId9"/>
-    <p:sldId id="263" r:id="rId10"/>
-    <p:sldId id="273" r:id="rId11"/>
-    <p:sldId id="278" r:id="rId12"/>
-    <p:sldId id="279" r:id="rId13"/>
-    <p:sldId id="272" r:id="rId14"/>
-    <p:sldId id="274" r:id="rId15"/>
-    <p:sldId id="275" r:id="rId16"/>
-    <p:sldId id="265" r:id="rId17"/>
-    <p:sldId id="266" r:id="rId18"/>
+    <p:sldId id="280" r:id="rId10"/>
+    <p:sldId id="263" r:id="rId11"/>
+    <p:sldId id="273" r:id="rId12"/>
+    <p:sldId id="278" r:id="rId13"/>
+    <p:sldId id="279" r:id="rId14"/>
+    <p:sldId id="272" r:id="rId15"/>
+    <p:sldId id="274" r:id="rId16"/>
+    <p:sldId id="275" r:id="rId17"/>
+    <p:sldId id="265" r:id="rId18"/>
+    <p:sldId id="266" r:id="rId19"/>
   </p:sldIdLst>
   <p:sldSz cx="12192000" cy="6858000"/>
   <p:notesSz cx="6858000" cy="9144000"/>
   <p:embeddedFontLst>
     <p:embeddedFont>
       <p:font typeface="D2Coding" panose="020B0609020101020101" pitchFamily="49" charset="-127"/>
-      <p:regular r:id="rId20"/>
-      <p:bold r:id="rId21"/>
+      <p:regular r:id="rId21"/>
+      <p:bold r:id="rId22"/>
     </p:embeddedFont>
     <p:embeddedFont>
       <p:font typeface="맑은 고딕" panose="020B0503020000020004" pitchFamily="50" charset="-127"/>
-      <p:regular r:id="rId22"/>
-      <p:bold r:id="rId23"/>
+      <p:regular r:id="rId23"/>
+      <p:bold r:id="rId24"/>
     </p:embeddedFont>
     <p:embeddedFont>
       <p:font typeface="배달의민족 주아" panose="02020603020101020101" pitchFamily="18" charset="-127"/>
-      <p:regular r:id="rId24"/>
+      <p:regular r:id="rId25"/>
     </p:embeddedFont>
   </p:embeddedFontLst>
   <p:defaultTextStyle>
@@ -252,7 +253,7 @@
           <a:p>
             <a:fld id="{F8FA7BD6-465B-4566-A77B-C01D79D878A4}" type="datetimeFigureOut">
               <a:rPr lang="ko-KR" altLang="en-US" smtClean="0"/>
-              <a:t>2024-05-20</a:t>
+              <a:t>2024-05-21</a:t>
             </a:fld>
             <a:endParaRPr lang="ko-KR" altLang="en-US"/>
           </a:p>
@@ -589,7 +590,7 @@
           <a:p>
             <a:fld id="{352FB854-5A39-426E-85B4-487B77F3CE82}" type="slidenum">
               <a:rPr lang="ko-KR" altLang="en-US" smtClean="0"/>
-              <a:t>16</a:t>
+              <a:t>17</a:t>
             </a:fld>
             <a:endParaRPr lang="ko-KR" altLang="en-US"/>
           </a:p>
@@ -787,7 +788,7 @@
           <a:p>
             <a:fld id="{5BCAD085-E8A6-8845-BD4E-CB4CCA059FC4}" type="datetimeFigureOut">
               <a:rPr lang="en-US" smtClean="0"/>
-              <a:t>5/20/2024</a:t>
+              <a:t>5/21/2024</a:t>
             </a:fld>
             <a:endParaRPr lang="en-US"/>
           </a:p>
@@ -955,7 +956,7 @@
           <a:p>
             <a:fld id="{5BCAD085-E8A6-8845-BD4E-CB4CCA059FC4}" type="datetimeFigureOut">
               <a:rPr lang="en-US" smtClean="0"/>
-              <a:t>5/20/2024</a:t>
+              <a:t>5/21/2024</a:t>
             </a:fld>
             <a:endParaRPr lang="en-US"/>
           </a:p>
@@ -1133,7 +1134,7 @@
           <a:p>
             <a:fld id="{5BCAD085-E8A6-8845-BD4E-CB4CCA059FC4}" type="datetimeFigureOut">
               <a:rPr lang="en-US" smtClean="0"/>
-              <a:t>5/20/2024</a:t>
+              <a:t>5/21/2024</a:t>
             </a:fld>
             <a:endParaRPr lang="en-US"/>
           </a:p>
@@ -1301,7 +1302,7 @@
           <a:p>
             <a:fld id="{5BCAD085-E8A6-8845-BD4E-CB4CCA059FC4}" type="datetimeFigureOut">
               <a:rPr lang="en-US" smtClean="0"/>
-              <a:t>5/20/2024</a:t>
+              <a:t>5/21/2024</a:t>
             </a:fld>
             <a:endParaRPr lang="en-US"/>
           </a:p>
@@ -1546,7 +1547,7 @@
           <a:p>
             <a:fld id="{5BCAD085-E8A6-8845-BD4E-CB4CCA059FC4}" type="datetimeFigureOut">
               <a:rPr lang="en-US" smtClean="0"/>
-              <a:t>5/20/2024</a:t>
+              <a:t>5/21/2024</a:t>
             </a:fld>
             <a:endParaRPr lang="en-US"/>
           </a:p>
@@ -1831,7 +1832,7 @@
           <a:p>
             <a:fld id="{5BCAD085-E8A6-8845-BD4E-CB4CCA059FC4}" type="datetimeFigureOut">
               <a:rPr lang="en-US" smtClean="0"/>
-              <a:t>5/20/2024</a:t>
+              <a:t>5/21/2024</a:t>
             </a:fld>
             <a:endParaRPr lang="en-US"/>
           </a:p>
@@ -2250,7 +2251,7 @@
           <a:p>
             <a:fld id="{5BCAD085-E8A6-8845-BD4E-CB4CCA059FC4}" type="datetimeFigureOut">
               <a:rPr lang="en-US" smtClean="0"/>
-              <a:t>5/20/2024</a:t>
+              <a:t>5/21/2024</a:t>
             </a:fld>
             <a:endParaRPr lang="en-US"/>
           </a:p>
@@ -2367,7 +2368,7 @@
           <a:p>
             <a:fld id="{5BCAD085-E8A6-8845-BD4E-CB4CCA059FC4}" type="datetimeFigureOut">
               <a:rPr lang="en-US" smtClean="0"/>
-              <a:t>5/20/2024</a:t>
+              <a:t>5/21/2024</a:t>
             </a:fld>
             <a:endParaRPr lang="en-US"/>
           </a:p>
@@ -2462,7 +2463,7 @@
           <a:p>
             <a:fld id="{5BCAD085-E8A6-8845-BD4E-CB4CCA059FC4}" type="datetimeFigureOut">
               <a:rPr lang="en-US" smtClean="0"/>
-              <a:t>5/20/2024</a:t>
+              <a:t>5/21/2024</a:t>
             </a:fld>
             <a:endParaRPr lang="en-US"/>
           </a:p>
@@ -2737,7 +2738,7 @@
           <a:p>
             <a:fld id="{5BCAD085-E8A6-8845-BD4E-CB4CCA059FC4}" type="datetimeFigureOut">
               <a:rPr lang="en-US" smtClean="0"/>
-              <a:t>5/20/2024</a:t>
+              <a:t>5/21/2024</a:t>
             </a:fld>
             <a:endParaRPr lang="en-US"/>
           </a:p>
@@ -2989,7 +2990,7 @@
           <a:p>
             <a:fld id="{5BCAD085-E8A6-8845-BD4E-CB4CCA059FC4}" type="datetimeFigureOut">
               <a:rPr lang="en-US" smtClean="0"/>
-              <a:t>5/20/2024</a:t>
+              <a:t>5/21/2024</a:t>
             </a:fld>
             <a:endParaRPr lang="en-US"/>
           </a:p>
@@ -3200,7 +3201,7 @@
           <a:p>
             <a:fld id="{5BCAD085-E8A6-8845-BD4E-CB4CCA059FC4}" type="datetimeFigureOut">
               <a:rPr lang="en-US" smtClean="0"/>
-              <a:t>5/20/2024</a:t>
+              <a:t>5/21/2024</a:t>
             </a:fld>
             <a:endParaRPr lang="en-US"/>
           </a:p>
@@ -3772,13 +3773,13 @@
   <p:clrMapOvr>
     <a:masterClrMapping/>
   </p:clrMapOvr>
-  <mc:AlternateContent xmlns:mc="http://schemas.openxmlformats.org/markup-compatibility/2006">
-    <mc:Choice xmlns:p159="http://schemas.microsoft.com/office/powerpoint/2015/09/main" Requires="p159">
+  <mc:AlternateContent xmlns:mc="http://schemas.openxmlformats.org/markup-compatibility/2006" xmlns:p159="http://schemas.microsoft.com/office/powerpoint/2015/09/main">
+    <mc:Choice Requires="p159">
       <p:transition xmlns:p14="http://schemas.microsoft.com/office/powerpoint/2010/main" spd="slow" p14:dur="2000">
         <p159:morph option="byWord"/>
       </p:transition>
     </mc:Choice>
-    <mc:Fallback>
+    <mc:Fallback xmlns="">
       <p:transition spd="slow">
         <p:fade/>
       </p:transition>
@@ -3788,6 +3789,320 @@
 </file>
 
 <file path=ppt/slides/slide10.xml><?xml version="1.0" encoding="utf-8"?>
+<p:sld xmlns:a="http://schemas.openxmlformats.org/drawingml/2006/main" xmlns:r="http://schemas.openxmlformats.org/officeDocument/2006/relationships" xmlns:p="http://schemas.openxmlformats.org/presentationml/2006/main">
+  <p:cSld>
+    <p:spTree>
+      <p:nvGrpSpPr>
+        <p:cNvPr id="1" name=""/>
+        <p:cNvGrpSpPr/>
+        <p:nvPr/>
+      </p:nvGrpSpPr>
+      <p:grpSpPr>
+        <a:xfrm>
+          <a:off x="0" y="0"/>
+          <a:ext cx="0" cy="0"/>
+          <a:chOff x="0" y="0"/>
+          <a:chExt cx="0" cy="0"/>
+        </a:xfrm>
+      </p:grpSpPr>
+      <p:sp>
+        <p:nvSpPr>
+          <p:cNvPr id="2" name="Title 1"/>
+          <p:cNvSpPr>
+            <a:spLocks noGrp="1"/>
+          </p:cNvSpPr>
+          <p:nvPr>
+            <p:ph type="title"/>
+          </p:nvPr>
+        </p:nvSpPr>
+        <p:spPr/>
+        <p:txBody>
+          <a:bodyPr/>
+          <a:lstStyle/>
+          <a:p>
+            <a:r>
+              <a:rPr dirty="0" err="1">
+                <a:latin typeface="배달의민족 주아" panose="02020603020101020101" pitchFamily="18" charset="-127"/>
+                <a:ea typeface="배달의민족 주아" panose="02020603020101020101" pitchFamily="18" charset="-127"/>
+              </a:rPr>
+              <a:t>모델</a:t>
+            </a:r>
+            <a:r>
+              <a:rPr dirty="0">
+                <a:latin typeface="배달의민족 주아" panose="02020603020101020101" pitchFamily="18" charset="-127"/>
+                <a:ea typeface="배달의민족 주아" panose="02020603020101020101" pitchFamily="18" charset="-127"/>
+              </a:rPr>
+              <a:t> </a:t>
+            </a:r>
+            <a:r>
+              <a:rPr dirty="0" err="1">
+                <a:latin typeface="배달의민족 주아" panose="02020603020101020101" pitchFamily="18" charset="-127"/>
+                <a:ea typeface="배달의민족 주아" panose="02020603020101020101" pitchFamily="18" charset="-127"/>
+              </a:rPr>
+              <a:t>구축</a:t>
+            </a:r>
+            <a:r>
+              <a:rPr dirty="0">
+                <a:latin typeface="배달의민족 주아" panose="02020603020101020101" pitchFamily="18" charset="-127"/>
+                <a:ea typeface="배달의민족 주아" panose="02020603020101020101" pitchFamily="18" charset="-127"/>
+              </a:rPr>
+              <a:t> (</a:t>
+            </a:r>
+            <a:r>
+              <a:rPr lang="ko-KR" altLang="en-US" dirty="0">
+                <a:latin typeface="배달의민족 주아" panose="02020603020101020101" pitchFamily="18" charset="-127"/>
+                <a:ea typeface="배달의민족 주아" panose="02020603020101020101" pitchFamily="18" charset="-127"/>
+              </a:rPr>
+              <a:t>개념 소개</a:t>
+            </a:r>
+            <a:r>
+              <a:rPr dirty="0">
+                <a:latin typeface="배달의민족 주아" panose="02020603020101020101" pitchFamily="18" charset="-127"/>
+                <a:ea typeface="배달의민족 주아" panose="02020603020101020101" pitchFamily="18" charset="-127"/>
+              </a:rPr>
+              <a:t>)</a:t>
+            </a:r>
+          </a:p>
+        </p:txBody>
+      </p:sp>
+      <p:sp>
+        <p:nvSpPr>
+          <p:cNvPr id="7" name="내용 개체 틀 6">
+            <a:extLst>
+              <a:ext uri="{FF2B5EF4-FFF2-40B4-BE49-F238E27FC236}">
+                <a16:creationId xmlns:a16="http://schemas.microsoft.com/office/drawing/2014/main" id="{CBCC7F44-3928-43F4-95F6-A67D68A43E2A}"/>
+              </a:ext>
+            </a:extLst>
+          </p:cNvPr>
+          <p:cNvSpPr>
+            <a:spLocks noGrp="1"/>
+          </p:cNvSpPr>
+          <p:nvPr>
+            <p:ph idx="1"/>
+          </p:nvPr>
+        </p:nvSpPr>
+        <p:spPr>
+          <a:ln>
+            <a:solidFill>
+              <a:schemeClr val="bg1"/>
+            </a:solidFill>
+          </a:ln>
+        </p:spPr>
+        <p:txBody>
+          <a:bodyPr/>
+          <a:lstStyle/>
+          <a:p>
+            <a:r>
+              <a:rPr lang="en-US" altLang="ko-KR" dirty="0">
+                <a:latin typeface="배달의민족 주아" panose="02020603020101020101" pitchFamily="18" charset="-127"/>
+                <a:ea typeface="배달의민족 주아" panose="02020603020101020101" pitchFamily="18" charset="-127"/>
+              </a:rPr>
+              <a:t>CNN</a:t>
+            </a:r>
+            <a:r>
+              <a:rPr lang="ko-KR" altLang="en-US" dirty="0">
+                <a:latin typeface="배달의민족 주아" panose="02020603020101020101" pitchFamily="18" charset="-127"/>
+                <a:ea typeface="배달의민족 주아" panose="02020603020101020101" pitchFamily="18" charset="-127"/>
+              </a:rPr>
+              <a:t>이란</a:t>
+            </a:r>
+            <a:r>
+              <a:rPr lang="en-US" altLang="ko-KR" dirty="0">
+                <a:latin typeface="배달의민족 주아" panose="02020603020101020101" pitchFamily="18" charset="-127"/>
+                <a:ea typeface="배달의민족 주아" panose="02020603020101020101" pitchFamily="18" charset="-127"/>
+              </a:rPr>
+              <a:t>? </a:t>
+            </a:r>
+            <a:r>
+              <a:rPr lang="ko-KR" altLang="en-US" dirty="0">
+                <a:latin typeface="배달의민족 주아" panose="02020603020101020101" pitchFamily="18" charset="-127"/>
+                <a:ea typeface="배달의민족 주아" panose="02020603020101020101" pitchFamily="18" charset="-127"/>
+              </a:rPr>
+              <a:t> </a:t>
+            </a:r>
+            <a:r>
+              <a:rPr lang="en-US" altLang="ko-KR" dirty="0">
+                <a:latin typeface="배달의민족 주아" panose="02020603020101020101" pitchFamily="18" charset="-127"/>
+                <a:ea typeface="배달의민족 주아" panose="02020603020101020101" pitchFamily="18" charset="-127"/>
+              </a:rPr>
+              <a:t>Convolutional Neural </a:t>
+            </a:r>
+            <a:r>
+              <a:rPr lang="en-US" altLang="ko-KR" dirty="0" err="1">
+                <a:latin typeface="배달의민족 주아" panose="02020603020101020101" pitchFamily="18" charset="-127"/>
+                <a:ea typeface="배달의민족 주아" panose="02020603020101020101" pitchFamily="18" charset="-127"/>
+              </a:rPr>
+              <a:t>NetWork</a:t>
+            </a:r>
+            <a:endParaRPr lang="en-US" altLang="ko-KR" dirty="0">
+              <a:latin typeface="배달의민족 주아" panose="02020603020101020101" pitchFamily="18" charset="-127"/>
+              <a:ea typeface="배달의민족 주아" panose="02020603020101020101" pitchFamily="18" charset="-127"/>
+            </a:endParaRPr>
+          </a:p>
+          <a:p>
+            <a:pPr>
+              <a:buFont typeface="Wingdings" panose="05000000000000000000" pitchFamily="2" charset="2"/>
+              <a:buChar char="à"/>
+            </a:pPr>
+            <a:r>
+              <a:rPr lang="ko-KR" altLang="en-US" sz="2500" dirty="0">
+                <a:latin typeface="배달의민족 주아" panose="02020603020101020101" pitchFamily="18" charset="-127"/>
+                <a:ea typeface="배달의민족 주아" panose="02020603020101020101" pitchFamily="18" charset="-127"/>
+                <a:sym typeface="Wingdings" panose="05000000000000000000" pitchFamily="2" charset="2"/>
+              </a:rPr>
+              <a:t>이미지의 데이터로부터 </a:t>
+            </a:r>
+            <a:r>
+              <a:rPr lang="en-US" altLang="ko-KR" sz="2500" dirty="0">
+                <a:solidFill>
+                  <a:srgbClr val="0070C0"/>
+                </a:solidFill>
+                <a:latin typeface="배달의민족 주아" panose="02020603020101020101" pitchFamily="18" charset="-127"/>
+                <a:ea typeface="배달의민족 주아" panose="02020603020101020101" pitchFamily="18" charset="-127"/>
+                <a:sym typeface="Wingdings" panose="05000000000000000000" pitchFamily="2" charset="2"/>
+              </a:rPr>
+              <a:t>feature map</a:t>
+            </a:r>
+            <a:r>
+              <a:rPr lang="ko-KR" altLang="en-US" sz="2500" dirty="0">
+                <a:latin typeface="배달의민족 주아" panose="02020603020101020101" pitchFamily="18" charset="-127"/>
+                <a:ea typeface="배달의민족 주아" panose="02020603020101020101" pitchFamily="18" charset="-127"/>
+                <a:sym typeface="Wingdings" panose="05000000000000000000" pitchFamily="2" charset="2"/>
+              </a:rPr>
+              <a:t>을 자동으로 추출해 이미지의 특징을 학습하는 모델</a:t>
+            </a:r>
+            <a:endParaRPr lang="en-US" altLang="ko-KR" sz="2500" dirty="0">
+              <a:latin typeface="배달의민족 주아" panose="02020603020101020101" pitchFamily="18" charset="-127"/>
+              <a:ea typeface="배달의민족 주아" panose="02020603020101020101" pitchFamily="18" charset="-127"/>
+              <a:sym typeface="Wingdings" panose="05000000000000000000" pitchFamily="2" charset="2"/>
+            </a:endParaRPr>
+          </a:p>
+          <a:p>
+            <a:pPr marL="0" indent="0">
+              <a:buNone/>
+            </a:pPr>
+            <a:endParaRPr lang="en-US" altLang="ko-KR" sz="2500" dirty="0">
+              <a:latin typeface="배달의민족 주아" panose="02020603020101020101" pitchFamily="18" charset="-127"/>
+              <a:ea typeface="배달의민족 주아" panose="02020603020101020101" pitchFamily="18" charset="-127"/>
+              <a:sym typeface="Wingdings" panose="05000000000000000000" pitchFamily="2" charset="2"/>
+            </a:endParaRPr>
+          </a:p>
+          <a:p>
+            <a:pPr marL="0" indent="0">
+              <a:buNone/>
+            </a:pPr>
+            <a:r>
+              <a:rPr lang="en-US" altLang="ko-KR" sz="2500" dirty="0">
+                <a:latin typeface="배달의민족 주아" panose="02020603020101020101" pitchFamily="18" charset="-127"/>
+                <a:ea typeface="배달의민족 주아" panose="02020603020101020101" pitchFamily="18" charset="-127"/>
+                <a:sym typeface="Wingdings" panose="05000000000000000000" pitchFamily="2" charset="2"/>
+              </a:rPr>
+              <a:t>*feature map </a:t>
+            </a:r>
+            <a:r>
+              <a:rPr lang="ko-KR" altLang="en-US" sz="2500" dirty="0">
+                <a:latin typeface="배달의민족 주아" panose="02020603020101020101" pitchFamily="18" charset="-127"/>
+                <a:ea typeface="배달의민족 주아" panose="02020603020101020101" pitchFamily="18" charset="-127"/>
+                <a:sym typeface="Wingdings" panose="05000000000000000000" pitchFamily="2" charset="2"/>
+              </a:rPr>
+              <a:t>이란</a:t>
+            </a:r>
+            <a:r>
+              <a:rPr lang="en-US" altLang="ko-KR" sz="2500" dirty="0">
+                <a:latin typeface="배달의민족 주아" panose="02020603020101020101" pitchFamily="18" charset="-127"/>
+                <a:ea typeface="배달의민족 주아" panose="02020603020101020101" pitchFamily="18" charset="-127"/>
+                <a:sym typeface="Wingdings" panose="05000000000000000000" pitchFamily="2" charset="2"/>
+              </a:rPr>
+              <a:t>?</a:t>
+            </a:r>
+          </a:p>
+          <a:p>
+            <a:pPr marL="0" indent="0">
+              <a:buNone/>
+            </a:pPr>
+            <a:r>
+              <a:rPr lang="en-US" altLang="ko-KR" sz="2500" dirty="0">
+                <a:latin typeface="배달의민족 주아" panose="02020603020101020101" pitchFamily="18" charset="-127"/>
+                <a:ea typeface="배달의민족 주아" panose="02020603020101020101" pitchFamily="18" charset="-127"/>
+                <a:sym typeface="Wingdings" panose="05000000000000000000" pitchFamily="2" charset="2"/>
+              </a:rPr>
+              <a:t> </a:t>
+            </a:r>
+            <a:r>
+              <a:rPr lang="ko-KR" altLang="en-US" sz="2500" dirty="0">
+                <a:solidFill>
+                  <a:srgbClr val="0070C0"/>
+                </a:solidFill>
+                <a:latin typeface="배달의민족 주아" panose="02020603020101020101" pitchFamily="18" charset="-127"/>
+                <a:ea typeface="배달의민족 주아" panose="02020603020101020101" pitchFamily="18" charset="-127"/>
+                <a:sym typeface="Wingdings" panose="05000000000000000000" pitchFamily="2" charset="2"/>
+              </a:rPr>
+              <a:t>모델이 학습하기 위해 만든 이미지의 특징</a:t>
+            </a:r>
+            <a:r>
+              <a:rPr lang="en-US" altLang="ko-KR" sz="2500" dirty="0">
+                <a:solidFill>
+                  <a:srgbClr val="0070C0"/>
+                </a:solidFill>
+                <a:latin typeface="배달의민족 주아" panose="02020603020101020101" pitchFamily="18" charset="-127"/>
+                <a:ea typeface="배달의민족 주아" panose="02020603020101020101" pitchFamily="18" charset="-127"/>
+                <a:sym typeface="Wingdings" panose="05000000000000000000" pitchFamily="2" charset="2"/>
+              </a:rPr>
+              <a:t>(feature)</a:t>
+            </a:r>
+            <a:r>
+              <a:rPr lang="ko-KR" altLang="en-US" sz="2500" dirty="0">
+                <a:solidFill>
+                  <a:srgbClr val="0070C0"/>
+                </a:solidFill>
+                <a:latin typeface="배달의민족 주아" panose="02020603020101020101" pitchFamily="18" charset="-127"/>
+                <a:ea typeface="배달의민족 주아" panose="02020603020101020101" pitchFamily="18" charset="-127"/>
+                <a:sym typeface="Wingdings" panose="05000000000000000000" pitchFamily="2" charset="2"/>
+              </a:rPr>
+              <a:t>을 담은 </a:t>
+            </a:r>
+            <a:r>
+              <a:rPr lang="en-US" altLang="ko-KR" sz="2500" dirty="0">
+                <a:solidFill>
+                  <a:srgbClr val="0070C0"/>
+                </a:solidFill>
+                <a:latin typeface="배달의민족 주아" panose="02020603020101020101" pitchFamily="18" charset="-127"/>
+                <a:ea typeface="배달의민족 주아" panose="02020603020101020101" pitchFamily="18" charset="-127"/>
+                <a:sym typeface="Wingdings" panose="05000000000000000000" pitchFamily="2" charset="2"/>
+              </a:rPr>
+              <a:t>map</a:t>
+            </a:r>
+            <a:endParaRPr lang="en-US" altLang="ko-KR" sz="2500" dirty="0">
+              <a:solidFill>
+                <a:srgbClr val="0070C0"/>
+              </a:solidFill>
+              <a:latin typeface="배달의민족 주아" panose="02020603020101020101" pitchFamily="18" charset="-127"/>
+              <a:ea typeface="배달의민족 주아" panose="02020603020101020101" pitchFamily="18" charset="-127"/>
+            </a:endParaRPr>
+          </a:p>
+        </p:txBody>
+      </p:sp>
+    </p:spTree>
+  </p:cSld>
+  <p:clrMapOvr>
+    <a:masterClrMapping/>
+  </p:clrMapOvr>
+  <mc:AlternateContent xmlns:mc="http://schemas.openxmlformats.org/markup-compatibility/2006" xmlns:p159="http://schemas.microsoft.com/office/powerpoint/2015/09/main">
+    <mc:Choice Requires="p159">
+      <p:transition xmlns:p14="http://schemas.microsoft.com/office/powerpoint/2010/main" spd="slow" p14:dur="2000">
+        <p159:morph option="byWord"/>
+      </p:transition>
+    </mc:Choice>
+    <mc:Fallback xmlns="">
+      <p:transition spd="slow">
+        <p:fade/>
+      </p:transition>
+    </mc:Fallback>
+  </mc:AlternateContent>
+</p:sld>
+</file>
+
+<file path=ppt/slides/slide11.xml><?xml version="1.0" encoding="utf-8"?>
 <p:sld xmlns:a="http://schemas.openxmlformats.org/drawingml/2006/main" xmlns:r="http://schemas.openxmlformats.org/officeDocument/2006/relationships" xmlns:p="http://schemas.openxmlformats.org/presentationml/2006/main">
   <p:cSld>
     <p:spTree>
@@ -9274,13 +9589,13 @@
   <p:clrMapOvr>
     <a:masterClrMapping/>
   </p:clrMapOvr>
-  <mc:AlternateContent xmlns:mc="http://schemas.openxmlformats.org/markup-compatibility/2006">
-    <mc:Choice xmlns:p159="http://schemas.microsoft.com/office/powerpoint/2015/09/main" Requires="p159">
+  <mc:AlternateContent xmlns:mc="http://schemas.openxmlformats.org/markup-compatibility/2006" xmlns:p159="http://schemas.microsoft.com/office/powerpoint/2015/09/main">
+    <mc:Choice Requires="p159">
       <p:transition xmlns:p14="http://schemas.microsoft.com/office/powerpoint/2010/main" spd="slow" p14:dur="2000">
         <p159:morph option="byWord"/>
       </p:transition>
     </mc:Choice>
-    <mc:Fallback>
+    <mc:Fallback xmlns="">
       <p:transition spd="slow">
         <p:fade/>
       </p:transition>
@@ -9289,7 +9604,7 @@
 </p:sld>
 </file>
 
-<file path=ppt/slides/slide11.xml><?xml version="1.0" encoding="utf-8"?>
+<file path=ppt/slides/slide12.xml><?xml version="1.0" encoding="utf-8"?>
 <p:sld xmlns:a="http://schemas.openxmlformats.org/drawingml/2006/main" xmlns:r="http://schemas.openxmlformats.org/officeDocument/2006/relationships" xmlns:p="http://schemas.openxmlformats.org/presentationml/2006/main">
   <p:cSld>
     <p:spTree>
@@ -12990,13 +13305,13 @@
   <p:clrMapOvr>
     <a:masterClrMapping/>
   </p:clrMapOvr>
-  <mc:AlternateContent xmlns:mc="http://schemas.openxmlformats.org/markup-compatibility/2006">
-    <mc:Choice xmlns:p159="http://schemas.microsoft.com/office/powerpoint/2015/09/main" Requires="p159">
+  <mc:AlternateContent xmlns:mc="http://schemas.openxmlformats.org/markup-compatibility/2006" xmlns:p159="http://schemas.microsoft.com/office/powerpoint/2015/09/main">
+    <mc:Choice Requires="p159">
       <p:transition xmlns:p14="http://schemas.microsoft.com/office/powerpoint/2010/main" spd="slow" p14:dur="2000">
         <p159:morph option="byWord"/>
       </p:transition>
     </mc:Choice>
-    <mc:Fallback>
+    <mc:Fallback xmlns="">
       <p:transition spd="slow">
         <p:fade/>
       </p:transition>
@@ -13005,7 +13320,7 @@
 </p:sld>
 </file>
 
-<file path=ppt/slides/slide12.xml><?xml version="1.0" encoding="utf-8"?>
+<file path=ppt/slides/slide13.xml><?xml version="1.0" encoding="utf-8"?>
 <p:sld xmlns:a="http://schemas.openxmlformats.org/drawingml/2006/main" xmlns:r="http://schemas.openxmlformats.org/officeDocument/2006/relationships" xmlns:p="http://schemas.openxmlformats.org/presentationml/2006/main">
   <p:cSld>
     <p:spTree>
@@ -19594,13 +19909,13 @@
   <p:clrMapOvr>
     <a:masterClrMapping/>
   </p:clrMapOvr>
-  <mc:AlternateContent xmlns:mc="http://schemas.openxmlformats.org/markup-compatibility/2006">
-    <mc:Choice xmlns:p159="http://schemas.microsoft.com/office/powerpoint/2015/09/main" Requires="p159">
+  <mc:AlternateContent xmlns:mc="http://schemas.openxmlformats.org/markup-compatibility/2006" xmlns:p159="http://schemas.microsoft.com/office/powerpoint/2015/09/main">
+    <mc:Choice Requires="p159">
       <p:transition xmlns:p14="http://schemas.microsoft.com/office/powerpoint/2010/main" spd="slow" p14:dur="2000">
         <p159:morph option="byWord"/>
       </p:transition>
     </mc:Choice>
-    <mc:Fallback>
+    <mc:Fallback xmlns="">
       <p:transition spd="slow">
         <p:fade/>
       </p:transition>
@@ -19609,7 +19924,7 @@
 </p:sld>
 </file>
 
-<file path=ppt/slides/slide13.xml><?xml version="1.0" encoding="utf-8"?>
+<file path=ppt/slides/slide14.xml><?xml version="1.0" encoding="utf-8"?>
 <p:sld xmlns:a="http://schemas.openxmlformats.org/drawingml/2006/main" xmlns:r="http://schemas.openxmlformats.org/officeDocument/2006/relationships" xmlns:p="http://schemas.openxmlformats.org/presentationml/2006/main">
   <p:cSld>
     <p:spTree>
@@ -20022,13 +20337,13 @@
   <p:clrMapOvr>
     <a:masterClrMapping/>
   </p:clrMapOvr>
-  <mc:AlternateContent xmlns:mc="http://schemas.openxmlformats.org/markup-compatibility/2006">
-    <mc:Choice xmlns:p159="http://schemas.microsoft.com/office/powerpoint/2015/09/main" Requires="p159">
+  <mc:AlternateContent xmlns:mc="http://schemas.openxmlformats.org/markup-compatibility/2006" xmlns:p159="http://schemas.microsoft.com/office/powerpoint/2015/09/main">
+    <mc:Choice Requires="p159">
       <p:transition xmlns:p14="http://schemas.microsoft.com/office/powerpoint/2010/main" spd="slow" p14:dur="2000">
         <p159:morph option="byWord"/>
       </p:transition>
     </mc:Choice>
-    <mc:Fallback>
+    <mc:Fallback xmlns="">
       <p:transition spd="slow">
         <p:fade/>
       </p:transition>
@@ -20117,7 +20432,7 @@
 </p:sld>
 </file>
 
-<file path=ppt/slides/slide14.xml><?xml version="1.0" encoding="utf-8"?>
+<file path=ppt/slides/slide15.xml><?xml version="1.0" encoding="utf-8"?>
 <p:sld xmlns:a="http://schemas.openxmlformats.org/drawingml/2006/main" xmlns:r="http://schemas.openxmlformats.org/officeDocument/2006/relationships" xmlns:p="http://schemas.openxmlformats.org/presentationml/2006/main">
   <p:cSld>
     <p:spTree>
@@ -20240,13 +20555,13 @@
   <p:clrMapOvr>
     <a:masterClrMapping/>
   </p:clrMapOvr>
-  <mc:AlternateContent xmlns:mc="http://schemas.openxmlformats.org/markup-compatibility/2006">
-    <mc:Choice xmlns:p159="http://schemas.microsoft.com/office/powerpoint/2015/09/main" Requires="p159">
+  <mc:AlternateContent xmlns:mc="http://schemas.openxmlformats.org/markup-compatibility/2006" xmlns:p159="http://schemas.microsoft.com/office/powerpoint/2015/09/main">
+    <mc:Choice Requires="p159">
       <p:transition xmlns:p14="http://schemas.microsoft.com/office/powerpoint/2010/main" spd="slow" p14:dur="2000">
         <p159:morph option="byWord"/>
       </p:transition>
     </mc:Choice>
-    <mc:Fallback>
+    <mc:Fallback xmlns="">
       <p:transition spd="slow">
         <p:fade/>
       </p:transition>
@@ -20255,7 +20570,7 @@
 </p:sld>
 </file>
 
-<file path=ppt/slides/slide15.xml><?xml version="1.0" encoding="utf-8"?>
+<file path=ppt/slides/slide16.xml><?xml version="1.0" encoding="utf-8"?>
 <p:sld xmlns:a="http://schemas.openxmlformats.org/drawingml/2006/main" xmlns:r="http://schemas.openxmlformats.org/officeDocument/2006/relationships" xmlns:p="http://schemas.openxmlformats.org/presentationml/2006/main">
   <p:cSld>
     <p:spTree>
@@ -20378,13 +20693,13 @@
   <p:clrMapOvr>
     <a:masterClrMapping/>
   </p:clrMapOvr>
-  <mc:AlternateContent xmlns:mc="http://schemas.openxmlformats.org/markup-compatibility/2006">
-    <mc:Choice xmlns:p159="http://schemas.microsoft.com/office/powerpoint/2015/09/main" Requires="p159">
+  <mc:AlternateContent xmlns:mc="http://schemas.openxmlformats.org/markup-compatibility/2006" xmlns:p159="http://schemas.microsoft.com/office/powerpoint/2015/09/main">
+    <mc:Choice Requires="p159">
       <p:transition xmlns:p14="http://schemas.microsoft.com/office/powerpoint/2010/main" spd="slow" p14:dur="2000">
         <p159:morph option="byWord"/>
       </p:transition>
     </mc:Choice>
-    <mc:Fallback>
+    <mc:Fallback xmlns="">
       <p:transition spd="slow">
         <p:fade/>
       </p:transition>
@@ -20393,7 +20708,7 @@
 </p:sld>
 </file>
 
-<file path=ppt/slides/slide16.xml><?xml version="1.0" encoding="utf-8"?>
+<file path=ppt/slides/slide17.xml><?xml version="1.0" encoding="utf-8"?>
 <p:sld xmlns:a="http://schemas.openxmlformats.org/drawingml/2006/main" xmlns:r="http://schemas.openxmlformats.org/officeDocument/2006/relationships" xmlns:p="http://schemas.openxmlformats.org/presentationml/2006/main">
   <p:cSld>
     <p:spTree>
@@ -21323,13 +21638,13 @@
   <p:clrMapOvr>
     <a:masterClrMapping/>
   </p:clrMapOvr>
-  <mc:AlternateContent xmlns:mc="http://schemas.openxmlformats.org/markup-compatibility/2006">
-    <mc:Choice xmlns:p159="http://schemas.microsoft.com/office/powerpoint/2015/09/main" Requires="p159">
+  <mc:AlternateContent xmlns:mc="http://schemas.openxmlformats.org/markup-compatibility/2006" xmlns:p159="http://schemas.microsoft.com/office/powerpoint/2015/09/main">
+    <mc:Choice Requires="p159">
       <p:transition xmlns:p14="http://schemas.microsoft.com/office/powerpoint/2010/main" spd="slow" p14:dur="2000">
         <p159:morph option="byWord"/>
       </p:transition>
     </mc:Choice>
-    <mc:Fallback>
+    <mc:Fallback xmlns="">
       <p:transition spd="slow">
         <p:fade/>
       </p:transition>
@@ -21338,7 +21653,7 @@
 </p:sld>
 </file>
 
-<file path=ppt/slides/slide17.xml><?xml version="1.0" encoding="utf-8"?>
+<file path=ppt/slides/slide18.xml><?xml version="1.0" encoding="utf-8"?>
 <p:sld xmlns:a="http://schemas.openxmlformats.org/drawingml/2006/main" xmlns:r="http://schemas.openxmlformats.org/officeDocument/2006/relationships" xmlns:p="http://schemas.openxmlformats.org/presentationml/2006/main">
   <p:cSld>
     <p:spTree>
@@ -21912,13 +22227,13 @@
   <p:clrMapOvr>
     <a:masterClrMapping/>
   </p:clrMapOvr>
-  <mc:AlternateContent xmlns:mc="http://schemas.openxmlformats.org/markup-compatibility/2006">
-    <mc:Choice xmlns:p159="http://schemas.microsoft.com/office/powerpoint/2015/09/main" Requires="p159">
+  <mc:AlternateContent xmlns:mc="http://schemas.openxmlformats.org/markup-compatibility/2006" xmlns:p159="http://schemas.microsoft.com/office/powerpoint/2015/09/main">
+    <mc:Choice Requires="p159">
       <p:transition xmlns:p14="http://schemas.microsoft.com/office/powerpoint/2010/main" spd="slow" p14:dur="2000">
         <p159:morph option="byWord"/>
       </p:transition>
     </mc:Choice>
-    <mc:Fallback>
+    <mc:Fallback xmlns="">
       <p:transition spd="slow">
         <p:fade/>
       </p:transition>
@@ -22061,13 +22376,13 @@
   <p:clrMapOvr>
     <a:masterClrMapping/>
   </p:clrMapOvr>
-  <mc:AlternateContent xmlns:mc="http://schemas.openxmlformats.org/markup-compatibility/2006">
-    <mc:Choice xmlns:p159="http://schemas.microsoft.com/office/powerpoint/2015/09/main" Requires="p159">
+  <mc:AlternateContent xmlns:mc="http://schemas.openxmlformats.org/markup-compatibility/2006" xmlns:p159="http://schemas.microsoft.com/office/powerpoint/2015/09/main">
+    <mc:Choice Requires="p159">
       <p:transition xmlns:p14="http://schemas.microsoft.com/office/powerpoint/2010/main" spd="slow" p14:dur="2000">
         <p159:morph option="byWord"/>
       </p:transition>
     </mc:Choice>
-    <mc:Fallback>
+    <mc:Fallback xmlns="">
       <p:transition spd="slow">
         <p:fade/>
       </p:transition>
@@ -22173,13 +22488,13 @@
   <p:clrMapOvr>
     <a:masterClrMapping/>
   </p:clrMapOvr>
-  <mc:AlternateContent xmlns:mc="http://schemas.openxmlformats.org/markup-compatibility/2006">
-    <mc:Choice xmlns:p159="http://schemas.microsoft.com/office/powerpoint/2015/09/main" Requires="p159">
+  <mc:AlternateContent xmlns:mc="http://schemas.openxmlformats.org/markup-compatibility/2006" xmlns:p159="http://schemas.microsoft.com/office/powerpoint/2015/09/main">
+    <mc:Choice Requires="p159">
       <p:transition xmlns:p14="http://schemas.microsoft.com/office/powerpoint/2010/main" spd="slow" p14:dur="2000">
         <p159:morph option="byWord"/>
       </p:transition>
     </mc:Choice>
-    <mc:Fallback>
+    <mc:Fallback xmlns="">
       <p:transition spd="slow">
         <p:fade/>
       </p:transition>
@@ -22647,13 +22962,13 @@
   <p:clrMapOvr>
     <a:masterClrMapping/>
   </p:clrMapOvr>
-  <mc:AlternateContent xmlns:mc="http://schemas.openxmlformats.org/markup-compatibility/2006">
-    <mc:Choice xmlns:p159="http://schemas.microsoft.com/office/powerpoint/2015/09/main" Requires="p159">
+  <mc:AlternateContent xmlns:mc="http://schemas.openxmlformats.org/markup-compatibility/2006" xmlns:p159="http://schemas.microsoft.com/office/powerpoint/2015/09/main">
+    <mc:Choice Requires="p159">
       <p:transition xmlns:p14="http://schemas.microsoft.com/office/powerpoint/2010/main" spd="slow" p14:dur="2000">
         <p159:morph option="byWord"/>
       </p:transition>
     </mc:Choice>
-    <mc:Fallback>
+    <mc:Fallback xmlns="">
       <p:transition spd="slow">
         <p:fade/>
       </p:transition>
@@ -23036,13 +23351,13 @@
   <p:clrMapOvr>
     <a:masterClrMapping/>
   </p:clrMapOvr>
-  <mc:AlternateContent xmlns:mc="http://schemas.openxmlformats.org/markup-compatibility/2006">
-    <mc:Choice xmlns:p159="http://schemas.microsoft.com/office/powerpoint/2015/09/main" Requires="p159">
+  <mc:AlternateContent xmlns:mc="http://schemas.openxmlformats.org/markup-compatibility/2006" xmlns:p159="http://schemas.microsoft.com/office/powerpoint/2015/09/main">
+    <mc:Choice Requires="p159">
       <p:transition xmlns:p14="http://schemas.microsoft.com/office/powerpoint/2010/main" spd="slow" p14:dur="2000">
         <p159:morph option="byWord"/>
       </p:transition>
     </mc:Choice>
-    <mc:Fallback>
+    <mc:Fallback xmlns="">
       <p:transition spd="slow">
         <p:fade/>
       </p:transition>
@@ -23438,13 +23753,13 @@
   <p:clrMapOvr>
     <a:masterClrMapping/>
   </p:clrMapOvr>
-  <mc:AlternateContent xmlns:mc="http://schemas.openxmlformats.org/markup-compatibility/2006">
-    <mc:Choice xmlns:p159="http://schemas.microsoft.com/office/powerpoint/2015/09/main" Requires="p159">
+  <mc:AlternateContent xmlns:mc="http://schemas.openxmlformats.org/markup-compatibility/2006" xmlns:p159="http://schemas.microsoft.com/office/powerpoint/2015/09/main">
+    <mc:Choice Requires="p159">
       <p:transition xmlns:p14="http://schemas.microsoft.com/office/powerpoint/2010/main" spd="slow" p14:dur="2000">
         <p159:morph option="byWord"/>
       </p:transition>
     </mc:Choice>
-    <mc:Fallback>
+    <mc:Fallback xmlns="">
       <p:transition spd="slow">
         <p:fade/>
       </p:transition>
@@ -23805,13 +24120,13 @@
   <p:clrMapOvr>
     <a:masterClrMapping/>
   </p:clrMapOvr>
-  <mc:AlternateContent xmlns:mc="http://schemas.openxmlformats.org/markup-compatibility/2006">
-    <mc:Choice xmlns:p159="http://schemas.microsoft.com/office/powerpoint/2015/09/main" Requires="p159">
+  <mc:AlternateContent xmlns:mc="http://schemas.openxmlformats.org/markup-compatibility/2006" xmlns:p159="http://schemas.microsoft.com/office/powerpoint/2015/09/main">
+    <mc:Choice Requires="p159">
       <p:transition xmlns:p14="http://schemas.microsoft.com/office/powerpoint/2010/main" spd="slow" p14:dur="2000">
         <p159:morph option="byWord"/>
       </p:transition>
     </mc:Choice>
-    <mc:Fallback>
+    <mc:Fallback xmlns="">
       <p:transition spd="slow">
         <p:fade/>
       </p:transition>
@@ -26837,13 +27152,13 @@
   <p:clrMapOvr>
     <a:masterClrMapping/>
   </p:clrMapOvr>
-  <mc:AlternateContent xmlns:mc="http://schemas.openxmlformats.org/markup-compatibility/2006">
-    <mc:Choice xmlns:p159="http://schemas.microsoft.com/office/powerpoint/2015/09/main" Requires="p159">
+  <mc:AlternateContent xmlns:mc="http://schemas.openxmlformats.org/markup-compatibility/2006" xmlns:p159="http://schemas.microsoft.com/office/powerpoint/2015/09/main">
+    <mc:Choice Requires="p159">
       <p:transition xmlns:p14="http://schemas.microsoft.com/office/powerpoint/2010/main" spd="slow" p14:dur="2000">
         <p159:morph option="byWord"/>
       </p:transition>
     </mc:Choice>
-    <mc:Fallback>
+    <mc:Fallback xmlns="">
       <p:transition spd="slow">
         <p:fade/>
       </p:transition>
@@ -26869,6 +27184,92 @@
           <a:chExt cx="0" cy="0"/>
         </a:xfrm>
       </p:grpSpPr>
+      <p:pic>
+        <p:nvPicPr>
+          <p:cNvPr id="1028" name="Picture 4">
+            <a:extLst>
+              <a:ext uri="{FF2B5EF4-FFF2-40B4-BE49-F238E27FC236}">
+                <a16:creationId xmlns:a16="http://schemas.microsoft.com/office/drawing/2014/main" id="{6DD619FF-C129-628A-70A3-871AA61A606C}"/>
+              </a:ext>
+            </a:extLst>
+          </p:cNvPr>
+          <p:cNvPicPr>
+            <a:picLocks noChangeAspect="1" noChangeArrowheads="1"/>
+          </p:cNvPicPr>
+          <p:nvPr/>
+        </p:nvPicPr>
+        <p:blipFill>
+          <a:blip r:embed="rId2">
+            <a:clrChange>
+              <a:clrFrom>
+                <a:srgbClr val="FFFFFF"/>
+              </a:clrFrom>
+              <a:clrTo>
+                <a:srgbClr val="FFFFFF">
+                  <a:alpha val="0"/>
+                </a:srgbClr>
+              </a:clrTo>
+            </a:clrChange>
+            <a:extLst>
+              <a:ext uri="{28A0092B-C50C-407E-A947-70E740481C1C}">
+                <a14:useLocalDpi xmlns:a14="http://schemas.microsoft.com/office/drawing/2010/main" val="0"/>
+              </a:ext>
+            </a:extLst>
+          </a:blip>
+          <a:srcRect/>
+          <a:stretch>
+            <a:fillRect/>
+          </a:stretch>
+        </p:blipFill>
+        <p:spPr bwMode="auto">
+          <a:xfrm>
+            <a:off x="267931" y="164886"/>
+            <a:ext cx="4234360" cy="1564223"/>
+          </a:xfrm>
+          <a:prstGeom prst="rect">
+            <a:avLst/>
+          </a:prstGeom>
+          <a:noFill/>
+          <a:extLst>
+            <a:ext uri="{909E8E84-426E-40DD-AFC4-6F175D3DCCD1}">
+              <a14:hiddenFill xmlns:a14="http://schemas.microsoft.com/office/drawing/2010/main">
+                <a:solidFill>
+                  <a:srgbClr val="FFFFFF"/>
+                </a:solidFill>
+              </a14:hiddenFill>
+            </a:ext>
+          </a:extLst>
+        </p:spPr>
+      </p:pic>
+      <p:pic>
+        <p:nvPicPr>
+          <p:cNvPr id="9" name="그림 8">
+            <a:extLst>
+              <a:ext uri="{FF2B5EF4-FFF2-40B4-BE49-F238E27FC236}">
+                <a16:creationId xmlns:a16="http://schemas.microsoft.com/office/drawing/2014/main" id="{D5896830-1A7A-AE13-7DBF-47DA711011FE}"/>
+              </a:ext>
+            </a:extLst>
+          </p:cNvPr>
+          <p:cNvPicPr>
+            <a:picLocks noChangeAspect="1"/>
+          </p:cNvPicPr>
+          <p:nvPr/>
+        </p:nvPicPr>
+        <p:blipFill rotWithShape="1">
+          <a:blip r:embed="rId3"/>
+          <a:srcRect l="6861"/>
+          <a:stretch/>
+        </p:blipFill>
+        <p:spPr>
+          <a:xfrm>
+            <a:off x="4551369" y="1338347"/>
+            <a:ext cx="3953233" cy="5378711"/>
+          </a:xfrm>
+          <a:prstGeom prst="rect">
+            <a:avLst/>
+          </a:prstGeom>
+        </p:spPr>
+      </p:pic>
       <p:sp>
         <p:nvSpPr>
           <p:cNvPr id="2" name="Title 1"/>
@@ -26879,274 +27280,843 @@
             <p:ph type="title"/>
           </p:nvPr>
         </p:nvSpPr>
-        <p:spPr/>
-        <p:txBody>
-          <a:bodyPr/>
-          <a:lstStyle/>
-          <a:p>
-            <a:r>
-              <a:rPr dirty="0" err="1">
-                <a:latin typeface="배달의민족 주아" panose="02020603020101020101" pitchFamily="18" charset="-127"/>
-                <a:ea typeface="배달의민족 주아" panose="02020603020101020101" pitchFamily="18" charset="-127"/>
-              </a:rPr>
-              <a:t>모델</a:t>
-            </a:r>
-            <a:r>
-              <a:rPr dirty="0">
-                <a:latin typeface="배달의민족 주아" panose="02020603020101020101" pitchFamily="18" charset="-127"/>
-                <a:ea typeface="배달의민족 주아" panose="02020603020101020101" pitchFamily="18" charset="-127"/>
-              </a:rPr>
-              <a:t> </a:t>
-            </a:r>
-            <a:r>
-              <a:rPr dirty="0" err="1">
-                <a:latin typeface="배달의민족 주아" panose="02020603020101020101" pitchFamily="18" charset="-127"/>
-                <a:ea typeface="배달의민족 주아" panose="02020603020101020101" pitchFamily="18" charset="-127"/>
-              </a:rPr>
-              <a:t>구축</a:t>
-            </a:r>
-            <a:r>
-              <a:rPr dirty="0">
-                <a:latin typeface="배달의민족 주아" panose="02020603020101020101" pitchFamily="18" charset="-127"/>
-                <a:ea typeface="배달의민족 주아" panose="02020603020101020101" pitchFamily="18" charset="-127"/>
-              </a:rPr>
-              <a:t> (</a:t>
-            </a:r>
-            <a:r>
-              <a:rPr lang="ko-KR" altLang="en-US" dirty="0">
-                <a:latin typeface="배달의민족 주아" panose="02020603020101020101" pitchFamily="18" charset="-127"/>
-                <a:ea typeface="배달의민족 주아" panose="02020603020101020101" pitchFamily="18" charset="-127"/>
-              </a:rPr>
-              <a:t>개념 소개</a:t>
-            </a:r>
-            <a:r>
-              <a:rPr dirty="0">
-                <a:latin typeface="배달의민족 주아" panose="02020603020101020101" pitchFamily="18" charset="-127"/>
-                <a:ea typeface="배달의민족 주아" panose="02020603020101020101" pitchFamily="18" charset="-127"/>
-              </a:rPr>
-              <a:t>)</a:t>
-            </a:r>
-          </a:p>
-        </p:txBody>
-      </p:sp>
-      <p:sp>
-        <p:nvSpPr>
-          <p:cNvPr id="7" name="내용 개체 틀 6">
-            <a:extLst>
-              <a:ext uri="{FF2B5EF4-FFF2-40B4-BE49-F238E27FC236}">
-                <a16:creationId xmlns:a16="http://schemas.microsoft.com/office/drawing/2014/main" id="{CBCC7F44-3928-43F4-95F6-A67D68A43E2A}"/>
-              </a:ext>
-            </a:extLst>
-          </p:cNvPr>
-          <p:cNvSpPr>
-            <a:spLocks noGrp="1"/>
-          </p:cNvSpPr>
-          <p:nvPr>
-            <p:ph idx="1"/>
-          </p:nvPr>
-        </p:nvSpPr>
         <p:spPr>
-          <a:ln>
-            <a:solidFill>
-              <a:schemeClr val="bg1"/>
-            </a:solidFill>
-          </a:ln>
+          <a:xfrm>
+            <a:off x="4840132" y="350265"/>
+            <a:ext cx="6762893" cy="694764"/>
+          </a:xfrm>
         </p:spPr>
         <p:txBody>
           <a:bodyPr/>
           <a:lstStyle/>
           <a:p>
             <a:r>
+              <a:rPr lang="ko-KR" altLang="en-US" dirty="0">
+                <a:latin typeface="배달의민족 주아" panose="02020603020101020101" pitchFamily="18" charset="-127"/>
+                <a:ea typeface="배달의민족 주아" panose="02020603020101020101" pitchFamily="18" charset="-127"/>
+              </a:rPr>
+              <a:t>여기서 잠깐</a:t>
+            </a:r>
+            <a:r>
               <a:rPr lang="en-US" altLang="ko-KR" dirty="0">
                 <a:latin typeface="배달의민족 주아" panose="02020603020101020101" pitchFamily="18" charset="-127"/>
                 <a:ea typeface="배달의민족 주아" panose="02020603020101020101" pitchFamily="18" charset="-127"/>
               </a:rPr>
-              <a:t>CNN</a:t>
+              <a:t>! </a:t>
             </a:r>
             <a:r>
               <a:rPr lang="ko-KR" altLang="en-US" dirty="0">
                 <a:latin typeface="배달의민족 주아" panose="02020603020101020101" pitchFamily="18" charset="-127"/>
                 <a:ea typeface="배달의민족 주아" panose="02020603020101020101" pitchFamily="18" charset="-127"/>
               </a:rPr>
-              <a:t>이란</a:t>
+              <a:t>이미지</a:t>
             </a:r>
             <a:r>
               <a:rPr lang="en-US" altLang="ko-KR" dirty="0">
                 <a:latin typeface="배달의민족 주아" panose="02020603020101020101" pitchFamily="18" charset="-127"/>
                 <a:ea typeface="배달의민족 주아" panose="02020603020101020101" pitchFamily="18" charset="-127"/>
               </a:rPr>
-              <a:t>? </a:t>
+              <a:t>(RGB)</a:t>
             </a:r>
             <a:r>
               <a:rPr lang="ko-KR" altLang="en-US" dirty="0">
                 <a:latin typeface="배달의민족 주아" panose="02020603020101020101" pitchFamily="18" charset="-127"/>
                 <a:ea typeface="배달의민족 주아" panose="02020603020101020101" pitchFamily="18" charset="-127"/>
               </a:rPr>
-              <a:t> </a:t>
+              <a:t>란</a:t>
             </a:r>
             <a:r>
               <a:rPr lang="en-US" altLang="ko-KR" dirty="0">
                 <a:latin typeface="배달의민족 주아" panose="02020603020101020101" pitchFamily="18" charset="-127"/>
                 <a:ea typeface="배달의민족 주아" panose="02020603020101020101" pitchFamily="18" charset="-127"/>
               </a:rPr>
-              <a:t>Convolutional Neural </a:t>
-            </a:r>
-            <a:r>
-              <a:rPr lang="en-US" altLang="ko-KR" dirty="0" err="1">
-                <a:latin typeface="배달의민족 주아" panose="02020603020101020101" pitchFamily="18" charset="-127"/>
-                <a:ea typeface="배달의민족 주아" panose="02020603020101020101" pitchFamily="18" charset="-127"/>
-              </a:rPr>
-              <a:t>NetWork</a:t>
-            </a:r>
-            <a:endParaRPr lang="en-US" altLang="ko-KR" dirty="0">
-              <a:latin typeface="배달의민족 주아" panose="02020603020101020101" pitchFamily="18" charset="-127"/>
-              <a:ea typeface="배달의민족 주아" panose="02020603020101020101" pitchFamily="18" charset="-127"/>
-            </a:endParaRPr>
-          </a:p>
-          <a:p>
-            <a:pPr>
-              <a:buFont typeface="Wingdings" panose="05000000000000000000" pitchFamily="2" charset="2"/>
-              <a:buChar char="à"/>
-            </a:pPr>
-            <a:r>
-              <a:rPr lang="ko-KR" altLang="en-US" sz="2500" dirty="0">
-                <a:latin typeface="배달의민족 주아" panose="02020603020101020101" pitchFamily="18" charset="-127"/>
-                <a:ea typeface="배달의민족 주아" panose="02020603020101020101" pitchFamily="18" charset="-127"/>
-                <a:sym typeface="Wingdings" panose="05000000000000000000" pitchFamily="2" charset="2"/>
-              </a:rPr>
-              <a:t>이미지의 데이터로부터 </a:t>
-            </a:r>
-            <a:r>
-              <a:rPr lang="en-US" altLang="ko-KR" sz="2500" dirty="0">
-                <a:solidFill>
-                  <a:srgbClr val="0070C0"/>
-                </a:solidFill>
-                <a:latin typeface="배달의민족 주아" panose="02020603020101020101" pitchFamily="18" charset="-127"/>
-                <a:ea typeface="배달의민족 주아" panose="02020603020101020101" pitchFamily="18" charset="-127"/>
-                <a:sym typeface="Wingdings" panose="05000000000000000000" pitchFamily="2" charset="2"/>
-              </a:rPr>
-              <a:t>feature map</a:t>
-            </a:r>
-            <a:r>
-              <a:rPr lang="ko-KR" altLang="en-US" sz="2500" dirty="0">
-                <a:latin typeface="배달의민족 주아" panose="02020603020101020101" pitchFamily="18" charset="-127"/>
-                <a:ea typeface="배달의민족 주아" panose="02020603020101020101" pitchFamily="18" charset="-127"/>
-                <a:sym typeface="Wingdings" panose="05000000000000000000" pitchFamily="2" charset="2"/>
-              </a:rPr>
-              <a:t>을 자동으로 추출해 이미지의 특징을 학습하는 모델</a:t>
-            </a:r>
-            <a:endParaRPr lang="en-US" altLang="ko-KR" sz="2500" dirty="0">
-              <a:latin typeface="배달의민족 주아" panose="02020603020101020101" pitchFamily="18" charset="-127"/>
-              <a:ea typeface="배달의민족 주아" panose="02020603020101020101" pitchFamily="18" charset="-127"/>
-              <a:sym typeface="Wingdings" panose="05000000000000000000" pitchFamily="2" charset="2"/>
-            </a:endParaRPr>
-          </a:p>
-          <a:p>
-            <a:pPr marL="0" indent="0">
-              <a:buNone/>
-            </a:pPr>
-            <a:endParaRPr lang="en-US" altLang="ko-KR" sz="2500" dirty="0">
-              <a:latin typeface="배달의민족 주아" panose="02020603020101020101" pitchFamily="18" charset="-127"/>
-              <a:ea typeface="배달의민족 주아" panose="02020603020101020101" pitchFamily="18" charset="-127"/>
-              <a:sym typeface="Wingdings" panose="05000000000000000000" pitchFamily="2" charset="2"/>
-            </a:endParaRPr>
-          </a:p>
-          <a:p>
-            <a:pPr marL="0" indent="0">
-              <a:buNone/>
-            </a:pPr>
-            <a:r>
-              <a:rPr lang="en-US" altLang="ko-KR" sz="2500" dirty="0">
-                <a:latin typeface="배달의민족 주아" panose="02020603020101020101" pitchFamily="18" charset="-127"/>
-                <a:ea typeface="배달의민족 주아" panose="02020603020101020101" pitchFamily="18" charset="-127"/>
-                <a:sym typeface="Wingdings" panose="05000000000000000000" pitchFamily="2" charset="2"/>
-              </a:rPr>
-              <a:t>*feature map </a:t>
-            </a:r>
-            <a:r>
-              <a:rPr lang="ko-KR" altLang="en-US" sz="2500" dirty="0">
-                <a:latin typeface="배달의민족 주아" panose="02020603020101020101" pitchFamily="18" charset="-127"/>
-                <a:ea typeface="배달의민족 주아" panose="02020603020101020101" pitchFamily="18" charset="-127"/>
-                <a:sym typeface="Wingdings" panose="05000000000000000000" pitchFamily="2" charset="2"/>
-              </a:rPr>
-              <a:t>이란</a:t>
-            </a:r>
-            <a:r>
-              <a:rPr lang="en-US" altLang="ko-KR" sz="2500" dirty="0">
-                <a:latin typeface="배달의민족 주아" panose="02020603020101020101" pitchFamily="18" charset="-127"/>
-                <a:ea typeface="배달의민족 주아" panose="02020603020101020101" pitchFamily="18" charset="-127"/>
-                <a:sym typeface="Wingdings" panose="05000000000000000000" pitchFamily="2" charset="2"/>
-              </a:rPr>
               <a:t>?</a:t>
             </a:r>
-          </a:p>
-          <a:p>
-            <a:pPr marL="0" indent="0">
-              <a:buNone/>
-            </a:pPr>
-            <a:r>
-              <a:rPr lang="en-US" altLang="ko-KR" sz="2500" dirty="0">
-                <a:latin typeface="배달의민족 주아" panose="02020603020101020101" pitchFamily="18" charset="-127"/>
-                <a:ea typeface="배달의민족 주아" panose="02020603020101020101" pitchFamily="18" charset="-127"/>
-                <a:sym typeface="Wingdings" panose="05000000000000000000" pitchFamily="2" charset="2"/>
-              </a:rPr>
-              <a:t> </a:t>
-            </a:r>
-            <a:r>
-              <a:rPr lang="ko-KR" altLang="en-US" sz="2500" dirty="0">
-                <a:solidFill>
-                  <a:srgbClr val="0070C0"/>
-                </a:solidFill>
-                <a:latin typeface="배달의민족 주아" panose="02020603020101020101" pitchFamily="18" charset="-127"/>
-                <a:ea typeface="배달의민족 주아" panose="02020603020101020101" pitchFamily="18" charset="-127"/>
-                <a:sym typeface="Wingdings" panose="05000000000000000000" pitchFamily="2" charset="2"/>
-              </a:rPr>
-              <a:t>모델이 학습하기 위해 만든 이미지의 특징</a:t>
-            </a:r>
-            <a:r>
-              <a:rPr lang="en-US" altLang="ko-KR" sz="2500" dirty="0">
-                <a:solidFill>
-                  <a:srgbClr val="0070C0"/>
-                </a:solidFill>
-                <a:latin typeface="배달의민족 주아" panose="02020603020101020101" pitchFamily="18" charset="-127"/>
-                <a:ea typeface="배달의민족 주아" panose="02020603020101020101" pitchFamily="18" charset="-127"/>
-                <a:sym typeface="Wingdings" panose="05000000000000000000" pitchFamily="2" charset="2"/>
-              </a:rPr>
-              <a:t>(feature)</a:t>
-            </a:r>
-            <a:r>
-              <a:rPr lang="ko-KR" altLang="en-US" sz="2500" dirty="0">
-                <a:solidFill>
-                  <a:srgbClr val="0070C0"/>
-                </a:solidFill>
-                <a:latin typeface="배달의민족 주아" panose="02020603020101020101" pitchFamily="18" charset="-127"/>
-                <a:ea typeface="배달의민족 주아" panose="02020603020101020101" pitchFamily="18" charset="-127"/>
-                <a:sym typeface="Wingdings" panose="05000000000000000000" pitchFamily="2" charset="2"/>
-              </a:rPr>
-              <a:t>을 담은 </a:t>
-            </a:r>
-            <a:r>
-              <a:rPr lang="en-US" altLang="ko-KR" sz="2500" dirty="0">
-                <a:solidFill>
-                  <a:srgbClr val="0070C0"/>
-                </a:solidFill>
-                <a:latin typeface="배달의민족 주아" panose="02020603020101020101" pitchFamily="18" charset="-127"/>
-                <a:ea typeface="배달의민족 주아" panose="02020603020101020101" pitchFamily="18" charset="-127"/>
-                <a:sym typeface="Wingdings" panose="05000000000000000000" pitchFamily="2" charset="2"/>
-              </a:rPr>
-              <a:t>map</a:t>
-            </a:r>
-            <a:endParaRPr lang="en-US" altLang="ko-KR" sz="2500" dirty="0">
-              <a:solidFill>
-                <a:srgbClr val="0070C0"/>
-              </a:solidFill>
+            <a:endParaRPr dirty="0">
               <a:latin typeface="배달의민족 주아" panose="02020603020101020101" pitchFamily="18" charset="-127"/>
               <a:ea typeface="배달의민족 주아" panose="02020603020101020101" pitchFamily="18" charset="-127"/>
             </a:endParaRPr>
           </a:p>
         </p:txBody>
       </p:sp>
+      <p:pic>
+        <p:nvPicPr>
+          <p:cNvPr id="24" name="그림 23">
+            <a:extLst>
+              <a:ext uri="{FF2B5EF4-FFF2-40B4-BE49-F238E27FC236}">
+                <a16:creationId xmlns:a16="http://schemas.microsoft.com/office/drawing/2014/main" id="{C38324F1-FAA1-3DEC-4337-4A9F35DFAE53}"/>
+              </a:ext>
+            </a:extLst>
+          </p:cNvPr>
+          <p:cNvPicPr>
+            <a:picLocks noChangeAspect="1"/>
+          </p:cNvPicPr>
+          <p:nvPr/>
+        </p:nvPicPr>
+        <p:blipFill>
+          <a:blip r:embed="rId4"/>
+          <a:stretch>
+            <a:fillRect/>
+          </a:stretch>
+        </p:blipFill>
+        <p:spPr>
+          <a:xfrm>
+            <a:off x="8598586" y="1498791"/>
+            <a:ext cx="3371111" cy="4755790"/>
+          </a:xfrm>
+          <a:prstGeom prst="rect">
+            <a:avLst/>
+          </a:prstGeom>
+        </p:spPr>
+      </p:pic>
+      <p:sp>
+        <p:nvSpPr>
+          <p:cNvPr id="28" name="Rectangle 3">
+            <a:extLst>
+              <a:ext uri="{FF2B5EF4-FFF2-40B4-BE49-F238E27FC236}">
+                <a16:creationId xmlns:a16="http://schemas.microsoft.com/office/drawing/2014/main" id="{A99A8448-DB3D-C544-F46A-E739480C29AD}"/>
+              </a:ext>
+            </a:extLst>
+          </p:cNvPr>
+          <p:cNvSpPr>
+            <a:spLocks noChangeArrowheads="1"/>
+          </p:cNvSpPr>
+          <p:nvPr/>
+        </p:nvSpPr>
+        <p:spPr bwMode="auto">
+          <a:xfrm>
+            <a:off x="8998036" y="1516338"/>
+            <a:ext cx="2943113" cy="651332"/>
+          </a:xfrm>
+          <a:prstGeom prst="rect">
+            <a:avLst/>
+          </a:prstGeom>
+          <a:solidFill>
+            <a:srgbClr val="F7F8FA"/>
+          </a:solidFill>
+          <a:ln w="9525">
+            <a:noFill/>
+            <a:miter lim="800000"/>
+            <a:headEnd/>
+            <a:tailEnd/>
+          </a:ln>
+          <a:effectLst/>
+        </p:spPr>
+        <p:txBody>
+          <a:bodyPr vert="horz" wrap="none" lIns="0" tIns="0" rIns="0" bIns="0" numCol="1" anchor="ctr" anchorCtr="0" compatLnSpc="1">
+            <a:prstTxWarp prst="textNoShape">
+              <a:avLst/>
+            </a:prstTxWarp>
+            <a:spAutoFit/>
+          </a:bodyPr>
+          <a:lstStyle/>
+          <a:p>
+            <a:pPr marL="0" marR="0" lvl="0" indent="0" algn="l" defTabSz="914400" rtl="0" eaLnBrk="0" fontAlgn="base" latinLnBrk="0" hangingPunct="0">
+              <a:lnSpc>
+                <a:spcPct val="130000"/>
+              </a:lnSpc>
+              <a:spcBef>
+                <a:spcPct val="0"/>
+              </a:spcBef>
+              <a:spcAft>
+                <a:spcPct val="0"/>
+              </a:spcAft>
+              <a:buClrTx/>
+              <a:buSzTx/>
+              <a:buFontTx/>
+              <a:buNone/>
+              <a:tabLst/>
+            </a:pPr>
+            <a:r>
+              <a:rPr kumimoji="0" lang="en-US" altLang="en-US" sz="1700" b="0" i="1" u="none" strike="noStrike" cap="none" normalizeH="0" baseline="0" dirty="0">
+                <a:ln>
+                  <a:noFill/>
+                </a:ln>
+                <a:solidFill>
+                  <a:srgbClr val="8C8C8C"/>
+                </a:solidFill>
+                <a:effectLst/>
+                <a:latin typeface="D2Coding" panose="020B0609020101020101" pitchFamily="49" charset="-127"/>
+                <a:ea typeface="D2Coding" panose="020B0609020101020101" pitchFamily="49" charset="-127"/>
+              </a:rPr>
+              <a:t># </a:t>
+            </a:r>
+            <a:r>
+              <a:rPr kumimoji="0" lang="en-US" altLang="en-US" sz="1700" b="0" i="1" u="none" strike="noStrike" cap="none" normalizeH="0" baseline="0" dirty="0" err="1">
+                <a:ln>
+                  <a:noFill/>
+                </a:ln>
+                <a:solidFill>
+                  <a:srgbClr val="8C8C8C"/>
+                </a:solidFill>
+                <a:effectLst/>
+                <a:latin typeface="D2Coding" panose="020B0609020101020101" pitchFamily="49" charset="-127"/>
+                <a:ea typeface="D2Coding" panose="020B0609020101020101" pitchFamily="49" charset="-127"/>
+              </a:rPr>
+              <a:t>데이터</a:t>
+            </a:r>
+            <a:r>
+              <a:rPr kumimoji="0" lang="en-US" altLang="en-US" sz="1700" b="0" i="1" u="none" strike="noStrike" cap="none" normalizeH="0" baseline="0" dirty="0">
+                <a:ln>
+                  <a:noFill/>
+                </a:ln>
+                <a:solidFill>
+                  <a:srgbClr val="8C8C8C"/>
+                </a:solidFill>
+                <a:effectLst/>
+                <a:latin typeface="D2Coding" panose="020B0609020101020101" pitchFamily="49" charset="-127"/>
+                <a:ea typeface="D2Coding" panose="020B0609020101020101" pitchFamily="49" charset="-127"/>
+              </a:rPr>
+              <a:t> 셋 </a:t>
+            </a:r>
+            <a:r>
+              <a:rPr kumimoji="0" lang="en-US" altLang="en-US" sz="1700" b="0" i="1" u="none" strike="noStrike" cap="none" normalizeH="0" baseline="0" dirty="0" err="1">
+                <a:ln>
+                  <a:noFill/>
+                </a:ln>
+                <a:solidFill>
+                  <a:srgbClr val="8C8C8C"/>
+                </a:solidFill>
+                <a:effectLst/>
+                <a:latin typeface="D2Coding" panose="020B0609020101020101" pitchFamily="49" charset="-127"/>
+                <a:ea typeface="D2Coding" panose="020B0609020101020101" pitchFamily="49" charset="-127"/>
+              </a:rPr>
+              <a:t>확인</a:t>
+            </a:r>
+            <a:br>
+              <a:rPr kumimoji="0" lang="en-US" altLang="en-US" sz="1700" b="0" i="1" u="none" strike="noStrike" cap="none" normalizeH="0" baseline="0" dirty="0">
+                <a:ln>
+                  <a:noFill/>
+                </a:ln>
+                <a:solidFill>
+                  <a:srgbClr val="8C8C8C"/>
+                </a:solidFill>
+                <a:effectLst/>
+                <a:latin typeface="D2Coding" panose="020B0609020101020101" pitchFamily="49" charset="-127"/>
+                <a:ea typeface="D2Coding" panose="020B0609020101020101" pitchFamily="49" charset="-127"/>
+              </a:rPr>
+            </a:br>
+            <a:r>
+              <a:rPr kumimoji="0" lang="en-US" altLang="en-US" sz="1700" b="0" i="0" u="none" strike="noStrike" cap="none" normalizeH="0" baseline="0" dirty="0" err="1">
+                <a:ln>
+                  <a:noFill/>
+                </a:ln>
+                <a:solidFill>
+                  <a:srgbClr val="080808"/>
+                </a:solidFill>
+                <a:effectLst/>
+                <a:latin typeface="D2Coding" panose="020B0609020101020101" pitchFamily="49" charset="-127"/>
+                <a:ea typeface="D2Coding" panose="020B0609020101020101" pitchFamily="49" charset="-127"/>
+              </a:rPr>
+              <a:t>plt.imshow</a:t>
+            </a:r>
+            <a:r>
+              <a:rPr kumimoji="0" lang="en-US" altLang="en-US" sz="1700" b="0" i="0" u="none" strike="noStrike" cap="none" normalizeH="0" baseline="0" dirty="0">
+                <a:ln>
+                  <a:noFill/>
+                </a:ln>
+                <a:solidFill>
+                  <a:srgbClr val="3F9101"/>
+                </a:solidFill>
+                <a:effectLst/>
+                <a:latin typeface="D2Coding" panose="020B0609020101020101" pitchFamily="49" charset="-127"/>
+                <a:ea typeface="D2Coding" panose="020B0609020101020101" pitchFamily="49" charset="-127"/>
+              </a:rPr>
+              <a:t>(</a:t>
+            </a:r>
+            <a:r>
+              <a:rPr kumimoji="0" lang="en-US" altLang="en-US" sz="1700" b="0" i="0" u="none" strike="noStrike" cap="none" normalizeH="0" baseline="0" dirty="0" err="1">
+                <a:ln>
+                  <a:noFill/>
+                </a:ln>
+                <a:solidFill>
+                  <a:srgbClr val="080808"/>
+                </a:solidFill>
+                <a:effectLst/>
+                <a:latin typeface="D2Coding" panose="020B0609020101020101" pitchFamily="49" charset="-127"/>
+                <a:ea typeface="D2Coding" panose="020B0609020101020101" pitchFamily="49" charset="-127"/>
+              </a:rPr>
+              <a:t>train_images</a:t>
+            </a:r>
+            <a:r>
+              <a:rPr kumimoji="0" lang="en-US" altLang="en-US" sz="1700" b="0" i="0" u="none" strike="noStrike" cap="none" normalizeH="0" baseline="0" dirty="0">
+                <a:ln>
+                  <a:noFill/>
+                </a:ln>
+                <a:solidFill>
+                  <a:srgbClr val="3F9101"/>
+                </a:solidFill>
+                <a:effectLst/>
+                <a:latin typeface="D2Coding" panose="020B0609020101020101" pitchFamily="49" charset="-127"/>
+                <a:ea typeface="D2Coding" panose="020B0609020101020101" pitchFamily="49" charset="-127"/>
+              </a:rPr>
+              <a:t>[</a:t>
+            </a:r>
+            <a:r>
+              <a:rPr kumimoji="0" lang="en-US" altLang="en-US" sz="1700" b="0" i="0" u="none" strike="noStrike" cap="none" normalizeH="0" baseline="0" dirty="0">
+                <a:ln>
+                  <a:noFill/>
+                </a:ln>
+                <a:solidFill>
+                  <a:srgbClr val="1750EB"/>
+                </a:solidFill>
+                <a:effectLst/>
+                <a:latin typeface="D2Coding" panose="020B0609020101020101" pitchFamily="49" charset="-127"/>
+                <a:ea typeface="D2Coding" panose="020B0609020101020101" pitchFamily="49" charset="-127"/>
+              </a:rPr>
+              <a:t>0</a:t>
+            </a:r>
+            <a:r>
+              <a:rPr kumimoji="0" lang="en-US" altLang="en-US" sz="1700" b="0" i="0" u="none" strike="noStrike" cap="none" normalizeH="0" baseline="0" dirty="0">
+                <a:ln>
+                  <a:noFill/>
+                </a:ln>
+                <a:solidFill>
+                  <a:srgbClr val="3F9101"/>
+                </a:solidFill>
+                <a:effectLst/>
+                <a:latin typeface="D2Coding" panose="020B0609020101020101" pitchFamily="49" charset="-127"/>
+                <a:ea typeface="D2Coding" panose="020B0609020101020101" pitchFamily="49" charset="-127"/>
+              </a:rPr>
+              <a:t>])</a:t>
+            </a:r>
+            <a:endParaRPr kumimoji="0" lang="en-US" altLang="en-US" sz="1700" b="0" i="0" u="none" strike="noStrike" cap="none" normalizeH="0" baseline="0" dirty="0">
+              <a:ln>
+                <a:noFill/>
+              </a:ln>
+              <a:solidFill>
+                <a:schemeClr val="tx1"/>
+              </a:solidFill>
+              <a:effectLst/>
+              <a:latin typeface="Arial" panose="020B0604020202020204" pitchFamily="34" charset="0"/>
+            </a:endParaRPr>
+          </a:p>
+        </p:txBody>
+      </p:sp>
+      <p:sp>
+        <p:nvSpPr>
+          <p:cNvPr id="4" name="Rectangle 3">
+            <a:extLst>
+              <a:ext uri="{FF2B5EF4-FFF2-40B4-BE49-F238E27FC236}">
+                <a16:creationId xmlns:a16="http://schemas.microsoft.com/office/drawing/2014/main" id="{4D6CF776-B60E-A197-74AF-0563F21D9140}"/>
+              </a:ext>
+            </a:extLst>
+          </p:cNvPr>
+          <p:cNvSpPr>
+            <a:spLocks noChangeArrowheads="1"/>
+          </p:cNvSpPr>
+          <p:nvPr/>
+        </p:nvSpPr>
+        <p:spPr bwMode="auto">
+          <a:xfrm>
+            <a:off x="4606654" y="1543613"/>
+            <a:ext cx="3836071" cy="886397"/>
+          </a:xfrm>
+          <a:prstGeom prst="rect">
+            <a:avLst/>
+          </a:prstGeom>
+          <a:solidFill>
+            <a:srgbClr val="F7F8FA"/>
+          </a:solidFill>
+          <a:ln w="9525">
+            <a:noFill/>
+            <a:miter lim="800000"/>
+            <a:headEnd/>
+            <a:tailEnd/>
+          </a:ln>
+          <a:effectLst/>
+        </p:spPr>
+        <p:txBody>
+          <a:bodyPr vert="horz" wrap="square" lIns="0" tIns="0" rIns="0" bIns="0" numCol="1" anchor="ctr" anchorCtr="0" compatLnSpc="1">
+            <a:prstTxWarp prst="textNoShape">
+              <a:avLst/>
+            </a:prstTxWarp>
+            <a:spAutoFit/>
+          </a:bodyPr>
+          <a:lstStyle/>
+          <a:p>
+            <a:pPr marL="0" marR="0" lvl="0" indent="0" algn="l" defTabSz="914400" rtl="0" eaLnBrk="0" fontAlgn="base" latinLnBrk="0" hangingPunct="0">
+              <a:lnSpc>
+                <a:spcPct val="130000"/>
+              </a:lnSpc>
+              <a:spcBef>
+                <a:spcPct val="0"/>
+              </a:spcBef>
+              <a:spcAft>
+                <a:spcPct val="0"/>
+              </a:spcAft>
+              <a:buClrTx/>
+              <a:buSzTx/>
+              <a:buFontTx/>
+              <a:buNone/>
+              <a:tabLst/>
+            </a:pPr>
+            <a:r>
+              <a:rPr kumimoji="0" lang="en-US" altLang="en-US" sz="1510" b="0" i="1" u="none" strike="noStrike" cap="none" normalizeH="0" baseline="0" dirty="0">
+                <a:ln>
+                  <a:noFill/>
+                </a:ln>
+                <a:solidFill>
+                  <a:srgbClr val="8C8C8C"/>
+                </a:solidFill>
+                <a:effectLst/>
+                <a:latin typeface="D2Coding" panose="020B0609020101020101" pitchFamily="49" charset="-127"/>
+                <a:ea typeface="D2Coding" panose="020B0609020101020101" pitchFamily="49" charset="-127"/>
+              </a:rPr>
+              <a:t># </a:t>
+            </a:r>
+            <a:r>
+              <a:rPr kumimoji="0" lang="en-US" altLang="en-US" sz="1510" b="0" i="1" u="none" strike="noStrike" cap="none" normalizeH="0" baseline="0" dirty="0" err="1">
+                <a:ln>
+                  <a:noFill/>
+                </a:ln>
+                <a:solidFill>
+                  <a:srgbClr val="8C8C8C"/>
+                </a:solidFill>
+                <a:effectLst/>
+                <a:latin typeface="D2Coding" panose="020B0609020101020101" pitchFamily="49" charset="-127"/>
+                <a:ea typeface="D2Coding" panose="020B0609020101020101" pitchFamily="49" charset="-127"/>
+              </a:rPr>
+              <a:t>데이터</a:t>
+            </a:r>
+            <a:r>
+              <a:rPr kumimoji="0" lang="en-US" altLang="en-US" sz="1510" b="0" i="1" u="none" strike="noStrike" cap="none" normalizeH="0" baseline="0" dirty="0">
+                <a:ln>
+                  <a:noFill/>
+                </a:ln>
+                <a:solidFill>
+                  <a:srgbClr val="8C8C8C"/>
+                </a:solidFill>
+                <a:effectLst/>
+                <a:latin typeface="D2Coding" panose="020B0609020101020101" pitchFamily="49" charset="-127"/>
+                <a:ea typeface="D2Coding" panose="020B0609020101020101" pitchFamily="49" charset="-127"/>
+              </a:rPr>
+              <a:t> 셋 </a:t>
+            </a:r>
+            <a:r>
+              <a:rPr kumimoji="0" lang="en-US" altLang="en-US" sz="1510" b="0" i="1" u="none" strike="noStrike" cap="none" normalizeH="0" baseline="0" dirty="0" err="1">
+                <a:ln>
+                  <a:noFill/>
+                </a:ln>
+                <a:solidFill>
+                  <a:srgbClr val="8C8C8C"/>
+                </a:solidFill>
+                <a:effectLst/>
+                <a:latin typeface="D2Coding" panose="020B0609020101020101" pitchFamily="49" charset="-127"/>
+                <a:ea typeface="D2Coding" panose="020B0609020101020101" pitchFamily="49" charset="-127"/>
+              </a:rPr>
+              <a:t>확인</a:t>
+            </a:r>
+            <a:endParaRPr kumimoji="0" lang="en-US" altLang="en-US" sz="1510" b="0" i="1" u="none" strike="noStrike" cap="none" normalizeH="0" baseline="0" dirty="0">
+              <a:ln>
+                <a:noFill/>
+              </a:ln>
+              <a:solidFill>
+                <a:srgbClr val="8C8C8C"/>
+              </a:solidFill>
+              <a:effectLst/>
+              <a:latin typeface="D2Coding" panose="020B0609020101020101" pitchFamily="49" charset="-127"/>
+              <a:ea typeface="D2Coding" panose="020B0609020101020101" pitchFamily="49" charset="-127"/>
+            </a:endParaRPr>
+          </a:p>
+          <a:p>
+            <a:pPr marL="0" marR="0" lvl="0" indent="0" algn="l" defTabSz="914400" rtl="0" eaLnBrk="0" fontAlgn="base" latinLnBrk="0" hangingPunct="0">
+              <a:lnSpc>
+                <a:spcPct val="130000"/>
+              </a:lnSpc>
+              <a:spcBef>
+                <a:spcPct val="0"/>
+              </a:spcBef>
+              <a:spcAft>
+                <a:spcPct val="0"/>
+              </a:spcAft>
+              <a:buClrTx/>
+              <a:buSzTx/>
+              <a:buFontTx/>
+              <a:buNone/>
+              <a:tabLst/>
+            </a:pPr>
+            <a:r>
+              <a:rPr lang="en-US" altLang="en-US" sz="1510" i="1" dirty="0">
+                <a:solidFill>
+                  <a:srgbClr val="8C8C8C"/>
+                </a:solidFill>
+                <a:latin typeface="D2Coding" panose="020B0609020101020101" pitchFamily="49" charset="-127"/>
+                <a:ea typeface="D2Coding" panose="020B0609020101020101" pitchFamily="49" charset="-127"/>
+              </a:rPr>
+              <a:t># 28*28 </a:t>
+            </a:r>
+            <a:r>
+              <a:rPr lang="ko-KR" altLang="en-US" sz="1510" i="1" dirty="0">
+                <a:solidFill>
+                  <a:srgbClr val="8C8C8C"/>
+                </a:solidFill>
+                <a:latin typeface="D2Coding" panose="020B0609020101020101" pitchFamily="49" charset="-127"/>
+                <a:ea typeface="D2Coding" panose="020B0609020101020101" pitchFamily="49" charset="-127"/>
+              </a:rPr>
+              <a:t>크기의 </a:t>
+            </a:r>
+            <a:r>
+              <a:rPr lang="en-US" altLang="ko-KR" sz="1510" i="1" dirty="0">
+                <a:solidFill>
+                  <a:srgbClr val="8C8C8C"/>
+                </a:solidFill>
+                <a:latin typeface="D2Coding" panose="020B0609020101020101" pitchFamily="49" charset="-127"/>
+                <a:ea typeface="D2Coding" panose="020B0609020101020101" pitchFamily="49" charset="-127"/>
+              </a:rPr>
+              <a:t>1</a:t>
+            </a:r>
+            <a:r>
+              <a:rPr lang="ko-KR" altLang="en-US" sz="1510" i="1" dirty="0">
+                <a:solidFill>
+                  <a:srgbClr val="8C8C8C"/>
+                </a:solidFill>
+                <a:latin typeface="D2Coding" panose="020B0609020101020101" pitchFamily="49" charset="-127"/>
+                <a:ea typeface="D2Coding" panose="020B0609020101020101" pitchFamily="49" charset="-127"/>
+              </a:rPr>
+              <a:t>채널 흑백 이미지</a:t>
+            </a:r>
+            <a:br>
+              <a:rPr kumimoji="0" lang="en-US" altLang="en-US" sz="1510" b="0" i="1" u="none" strike="noStrike" cap="none" normalizeH="0" baseline="0" dirty="0">
+                <a:ln>
+                  <a:noFill/>
+                </a:ln>
+                <a:solidFill>
+                  <a:srgbClr val="8C8C8C"/>
+                </a:solidFill>
+                <a:effectLst/>
+                <a:latin typeface="D2Coding" panose="020B0609020101020101" pitchFamily="49" charset="-127"/>
+                <a:ea typeface="D2Coding" panose="020B0609020101020101" pitchFamily="49" charset="-127"/>
+              </a:rPr>
+            </a:br>
+            <a:r>
+              <a:rPr kumimoji="0" lang="en-US" altLang="en-US" sz="1510" b="0" i="0" u="none" strike="noStrike" cap="none" normalizeH="0" baseline="0" dirty="0" err="1">
+                <a:ln>
+                  <a:noFill/>
+                </a:ln>
+                <a:solidFill>
+                  <a:srgbClr val="080808"/>
+                </a:solidFill>
+                <a:effectLst/>
+                <a:latin typeface="D2Coding" panose="020B0609020101020101" pitchFamily="49" charset="-127"/>
+                <a:ea typeface="D2Coding" panose="020B0609020101020101" pitchFamily="49" charset="-127"/>
+              </a:rPr>
+              <a:t>plt.imshow</a:t>
+            </a:r>
+            <a:r>
+              <a:rPr kumimoji="0" lang="en-US" altLang="en-US" sz="1510" b="0" i="0" u="none" strike="noStrike" cap="none" normalizeH="0" baseline="0" dirty="0">
+                <a:ln>
+                  <a:noFill/>
+                </a:ln>
+                <a:solidFill>
+                  <a:srgbClr val="3F9101"/>
+                </a:solidFill>
+                <a:effectLst/>
+                <a:latin typeface="D2Coding" panose="020B0609020101020101" pitchFamily="49" charset="-127"/>
+                <a:ea typeface="D2Coding" panose="020B0609020101020101" pitchFamily="49" charset="-127"/>
+              </a:rPr>
+              <a:t>(</a:t>
+            </a:r>
+            <a:r>
+              <a:rPr kumimoji="0" lang="en-US" altLang="en-US" sz="1510" b="0" i="0" u="none" strike="noStrike" cap="none" normalizeH="0" baseline="0" dirty="0" err="1">
+                <a:ln>
+                  <a:noFill/>
+                </a:ln>
+                <a:solidFill>
+                  <a:srgbClr val="080808"/>
+                </a:solidFill>
+                <a:effectLst/>
+                <a:latin typeface="D2Coding" panose="020B0609020101020101" pitchFamily="49" charset="-127"/>
+                <a:ea typeface="D2Coding" panose="020B0609020101020101" pitchFamily="49" charset="-127"/>
+              </a:rPr>
+              <a:t>train_images</a:t>
+            </a:r>
+            <a:r>
+              <a:rPr kumimoji="0" lang="en-US" altLang="en-US" sz="1510" b="0" i="0" u="none" strike="noStrike" cap="none" normalizeH="0" baseline="0" dirty="0">
+                <a:ln>
+                  <a:noFill/>
+                </a:ln>
+                <a:solidFill>
+                  <a:srgbClr val="3F9101"/>
+                </a:solidFill>
+                <a:effectLst/>
+                <a:latin typeface="D2Coding" panose="020B0609020101020101" pitchFamily="49" charset="-127"/>
+                <a:ea typeface="D2Coding" panose="020B0609020101020101" pitchFamily="49" charset="-127"/>
+              </a:rPr>
+              <a:t>[</a:t>
+            </a:r>
+            <a:r>
+              <a:rPr kumimoji="0" lang="en-US" altLang="en-US" sz="1510" b="0" i="0" u="none" strike="noStrike" cap="none" normalizeH="0" baseline="0" dirty="0">
+                <a:ln>
+                  <a:noFill/>
+                </a:ln>
+                <a:solidFill>
+                  <a:srgbClr val="1750EB"/>
+                </a:solidFill>
+                <a:effectLst/>
+                <a:latin typeface="D2Coding" panose="020B0609020101020101" pitchFamily="49" charset="-127"/>
+                <a:ea typeface="D2Coding" panose="020B0609020101020101" pitchFamily="49" charset="-127"/>
+              </a:rPr>
+              <a:t>0</a:t>
+            </a:r>
+            <a:r>
+              <a:rPr kumimoji="0" lang="en-US" altLang="en-US" sz="1510" b="0" i="0" u="none" strike="noStrike" cap="none" normalizeH="0" baseline="0" dirty="0">
+                <a:ln>
+                  <a:noFill/>
+                </a:ln>
+                <a:solidFill>
+                  <a:srgbClr val="3F9101"/>
+                </a:solidFill>
+                <a:effectLst/>
+                <a:latin typeface="D2Coding" panose="020B0609020101020101" pitchFamily="49" charset="-127"/>
+                <a:ea typeface="D2Coding" panose="020B0609020101020101" pitchFamily="49" charset="-127"/>
+              </a:rPr>
+              <a:t>]</a:t>
+            </a:r>
+            <a:r>
+              <a:rPr kumimoji="0" lang="en-US" altLang="en-US" sz="1510" b="0" i="0" u="none" strike="noStrike" cap="none" normalizeH="0" baseline="0" dirty="0">
+                <a:ln>
+                  <a:noFill/>
+                </a:ln>
+                <a:effectLst/>
+                <a:latin typeface="D2Coding" panose="020B0609020101020101" pitchFamily="49" charset="-127"/>
+                <a:ea typeface="D2Coding" panose="020B0609020101020101" pitchFamily="49" charset="-127"/>
+              </a:rPr>
+              <a:t>,</a:t>
+            </a:r>
+            <a:r>
+              <a:rPr kumimoji="0" lang="en-US" altLang="en-US" sz="1510" b="0" i="0" u="none" strike="noStrike" cap="none" normalizeH="0" baseline="0" dirty="0">
+                <a:ln>
+                  <a:noFill/>
+                </a:ln>
+                <a:solidFill>
+                  <a:srgbClr val="3F9101"/>
+                </a:solidFill>
+                <a:effectLst/>
+                <a:latin typeface="D2Coding" panose="020B0609020101020101" pitchFamily="49" charset="-127"/>
+                <a:ea typeface="D2Coding" panose="020B0609020101020101" pitchFamily="49" charset="-127"/>
+              </a:rPr>
+              <a:t> </a:t>
+            </a:r>
+            <a:r>
+              <a:rPr lang="en-US" altLang="en-US" sz="1510" dirty="0" err="1">
+                <a:solidFill>
+                  <a:srgbClr val="7030A0"/>
+                </a:solidFill>
+                <a:latin typeface="D2Coding" panose="020B0609020101020101" pitchFamily="49" charset="-127"/>
+                <a:ea typeface="D2Coding" panose="020B0609020101020101" pitchFamily="49" charset="-127"/>
+              </a:rPr>
+              <a:t>cmap</a:t>
+            </a:r>
+            <a:r>
+              <a:rPr lang="en-US" altLang="en-US" sz="1510" dirty="0">
+                <a:latin typeface="D2Coding" panose="020B0609020101020101" pitchFamily="49" charset="-127"/>
+                <a:ea typeface="D2Coding" panose="020B0609020101020101" pitchFamily="49" charset="-127"/>
+              </a:rPr>
+              <a:t>=</a:t>
+            </a:r>
+            <a:r>
+              <a:rPr kumimoji="0" lang="en-US" altLang="en-US" sz="1510" b="0" i="0" u="none" strike="noStrike" kern="1000" cap="none" spc="0" normalizeH="0" baseline="0" noProof="0" dirty="0">
+                <a:ln>
+                  <a:noFill/>
+                </a:ln>
+                <a:solidFill>
+                  <a:srgbClr val="C0504D">
+                    <a:lumMod val="75000"/>
+                  </a:srgbClr>
+                </a:solidFill>
+                <a:effectLst/>
+                <a:uLnTx/>
+                <a:uFillTx/>
+                <a:latin typeface="D2Coding" panose="020B0609020101020101" pitchFamily="49" charset="-127"/>
+                <a:ea typeface="D2Coding" panose="020B0609020101020101" pitchFamily="49" charset="-127"/>
+                <a:cs typeface="+mn-cs"/>
+              </a:rPr>
+              <a:t>"gray"</a:t>
+            </a:r>
+            <a:r>
+              <a:rPr kumimoji="0" lang="en-US" altLang="en-US" sz="1510" b="0" i="0" u="none" strike="noStrike" cap="none" normalizeH="0" baseline="0" dirty="0">
+                <a:ln>
+                  <a:noFill/>
+                </a:ln>
+                <a:solidFill>
+                  <a:srgbClr val="3F9101"/>
+                </a:solidFill>
+                <a:effectLst/>
+                <a:latin typeface="D2Coding" panose="020B0609020101020101" pitchFamily="49" charset="-127"/>
+                <a:ea typeface="D2Coding" panose="020B0609020101020101" pitchFamily="49" charset="-127"/>
+              </a:rPr>
+              <a:t>)</a:t>
+            </a:r>
+            <a:endParaRPr kumimoji="0" lang="en-US" altLang="en-US" sz="1510" b="0" i="0" u="none" strike="noStrike" cap="none" normalizeH="0" baseline="0" dirty="0">
+              <a:ln>
+                <a:noFill/>
+              </a:ln>
+              <a:solidFill>
+                <a:schemeClr val="tx1"/>
+              </a:solidFill>
+              <a:effectLst/>
+              <a:latin typeface="Arial" panose="020B0604020202020204" pitchFamily="34" charset="0"/>
+            </a:endParaRPr>
+          </a:p>
+        </p:txBody>
+      </p:sp>
+      <p:pic>
+        <p:nvPicPr>
+          <p:cNvPr id="1026" name="Picture 2">
+            <a:extLst>
+              <a:ext uri="{FF2B5EF4-FFF2-40B4-BE49-F238E27FC236}">
+                <a16:creationId xmlns:a16="http://schemas.microsoft.com/office/drawing/2014/main" id="{0682A3B9-98EE-7ECB-18A3-911D4813BCC7}"/>
+              </a:ext>
+            </a:extLst>
+          </p:cNvPr>
+          <p:cNvPicPr>
+            <a:picLocks noChangeAspect="1" noChangeArrowheads="1"/>
+          </p:cNvPicPr>
+          <p:nvPr/>
+        </p:nvPicPr>
+        <p:blipFill>
+          <a:blip r:embed="rId5">
+            <a:clrChange>
+              <a:clrFrom>
+                <a:srgbClr val="FFFFFF"/>
+              </a:clrFrom>
+              <a:clrTo>
+                <a:srgbClr val="FFFFFF">
+                  <a:alpha val="0"/>
+                </a:srgbClr>
+              </a:clrTo>
+            </a:clrChange>
+            <a:extLst>
+              <a:ext uri="{28A0092B-C50C-407E-A947-70E740481C1C}">
+                <a14:useLocalDpi xmlns:a14="http://schemas.microsoft.com/office/drawing/2010/main" val="0"/>
+              </a:ext>
+            </a:extLst>
+          </a:blip>
+          <a:srcRect/>
+          <a:stretch>
+            <a:fillRect/>
+          </a:stretch>
+        </p:blipFill>
+        <p:spPr bwMode="auto">
+          <a:xfrm>
+            <a:off x="165968" y="1729109"/>
+            <a:ext cx="3886476" cy="2805078"/>
+          </a:xfrm>
+          <a:prstGeom prst="rect">
+            <a:avLst/>
+          </a:prstGeom>
+          <a:noFill/>
+          <a:extLst>
+            <a:ext uri="{909E8E84-426E-40DD-AFC4-6F175D3DCCD1}">
+              <a14:hiddenFill xmlns:a14="http://schemas.microsoft.com/office/drawing/2010/main">
+                <a:solidFill>
+                  <a:srgbClr val="FFFFFF"/>
+                </a:solidFill>
+              </a14:hiddenFill>
+            </a:ext>
+          </a:extLst>
+        </p:spPr>
+      </p:pic>
+      <p:cxnSp>
+        <p:nvCxnSpPr>
+          <p:cNvPr id="10" name="직선 연결선 9">
+            <a:extLst>
+              <a:ext uri="{FF2B5EF4-FFF2-40B4-BE49-F238E27FC236}">
+                <a16:creationId xmlns:a16="http://schemas.microsoft.com/office/drawing/2014/main" id="{B5763376-6F05-DBFB-AAE1-34C821F1B823}"/>
+              </a:ext>
+            </a:extLst>
+          </p:cNvPr>
+          <p:cNvCxnSpPr>
+            <a:cxnSpLocks/>
+          </p:cNvCxnSpPr>
+          <p:nvPr/>
+        </p:nvCxnSpPr>
+        <p:spPr>
+          <a:xfrm>
+            <a:off x="4303863" y="1481233"/>
+            <a:ext cx="0" cy="5235825"/>
+          </a:xfrm>
+          <a:prstGeom prst="line">
+            <a:avLst/>
+          </a:prstGeom>
+          <a:ln w="12700">
+            <a:solidFill>
+              <a:schemeClr val="bg1">
+                <a:lumMod val="75000"/>
+              </a:schemeClr>
+            </a:solidFill>
+          </a:ln>
+          <a:effectLst/>
+        </p:spPr>
+        <p:style>
+          <a:lnRef idx="2">
+            <a:schemeClr val="accent1"/>
+          </a:lnRef>
+          <a:fillRef idx="0">
+            <a:schemeClr val="accent1"/>
+          </a:fillRef>
+          <a:effectRef idx="1">
+            <a:schemeClr val="accent1"/>
+          </a:effectRef>
+          <a:fontRef idx="minor">
+            <a:schemeClr val="tx1"/>
+          </a:fontRef>
+        </p:style>
+      </p:cxnSp>
+      <p:pic>
+        <p:nvPicPr>
+          <p:cNvPr id="1030" name="Picture 6" descr="멀티 채널 입력 데이터에 필터를 적용한 합성곱 계산 절차">
+            <a:extLst>
+              <a:ext uri="{FF2B5EF4-FFF2-40B4-BE49-F238E27FC236}">
+                <a16:creationId xmlns:a16="http://schemas.microsoft.com/office/drawing/2014/main" id="{8733DD6A-035E-8E40-AE99-29F2A7219490}"/>
+              </a:ext>
+            </a:extLst>
+          </p:cNvPr>
+          <p:cNvPicPr>
+            <a:picLocks noChangeAspect="1" noChangeArrowheads="1"/>
+          </p:cNvPicPr>
+          <p:nvPr/>
+        </p:nvPicPr>
+        <p:blipFill>
+          <a:blip r:embed="rId6">
+            <a:extLst>
+              <a:ext uri="{28A0092B-C50C-407E-A947-70E740481C1C}">
+                <a14:useLocalDpi xmlns:a14="http://schemas.microsoft.com/office/drawing/2010/main" val="0"/>
+              </a:ext>
+            </a:extLst>
+          </a:blip>
+          <a:srcRect/>
+          <a:stretch>
+            <a:fillRect/>
+          </a:stretch>
+        </p:blipFill>
+        <p:spPr bwMode="auto">
+          <a:xfrm>
+            <a:off x="984519" y="4599501"/>
+            <a:ext cx="2067402" cy="2172508"/>
+          </a:xfrm>
+          <a:prstGeom prst="rect">
+            <a:avLst/>
+          </a:prstGeom>
+          <a:noFill/>
+          <a:extLst>
+            <a:ext uri="{909E8E84-426E-40DD-AFC4-6F175D3DCCD1}">
+              <a14:hiddenFill xmlns:a14="http://schemas.microsoft.com/office/drawing/2010/main">
+                <a:solidFill>
+                  <a:srgbClr val="FFFFFF"/>
+                </a:solidFill>
+              </a14:hiddenFill>
+            </a:ext>
+          </a:extLst>
+        </p:spPr>
+      </p:pic>
     </p:spTree>
+    <p:extLst>
+      <p:ext uri="{BB962C8B-B14F-4D97-AF65-F5344CB8AC3E}">
+        <p14:creationId xmlns:p14="http://schemas.microsoft.com/office/powerpoint/2010/main" val="2303643835"/>
+      </p:ext>
+    </p:extLst>
   </p:cSld>
   <p:clrMapOvr>
     <a:masterClrMapping/>

</xml_diff>